<commit_message>
Moved helm chart into root of the repo
</commit_message>
<xml_diff>
--- a/docs/Presentation-Helm.pptx
+++ b/docs/Presentation-Helm.pptx
@@ -5,12 +5,15 @@
     <p:sldMasterId id="2147483672" r:id="rId1"/>
   </p:sldMasterIdLst>
   <p:notesMasterIdLst>
-    <p:notesMasterId r:id="rId5"/>
+    <p:notesMasterId r:id="rId8"/>
   </p:notesMasterIdLst>
   <p:sldIdLst>
     <p:sldId id="256" r:id="rId2"/>
     <p:sldId id="257" r:id="rId3"/>
     <p:sldId id="258" r:id="rId4"/>
+    <p:sldId id="259" r:id="rId5"/>
+    <p:sldId id="261" r:id="rId6"/>
+    <p:sldId id="260" r:id="rId7"/>
   </p:sldIdLst>
   <p:sldSz cx="12192000" cy="6858000"/>
   <p:notesSz cx="6858000" cy="9144000"/>
@@ -460,6 +463,90 @@
     </a:lvl9pPr>
   </p:notesStyle>
 </p:notesMaster>
+</file>
+
+<file path=ppt/notesSlides/notesSlide1.xml><?xml version="1.0" encoding="utf-8"?>
+<p:notes xmlns:a="http://schemas.openxmlformats.org/drawingml/2006/main" xmlns:r="http://schemas.openxmlformats.org/officeDocument/2006/relationships" xmlns:p="http://schemas.openxmlformats.org/presentationml/2006/main">
+  <p:cSld>
+    <p:spTree>
+      <p:nvGrpSpPr>
+        <p:cNvPr id="1" name=""/>
+        <p:cNvGrpSpPr/>
+        <p:nvPr/>
+      </p:nvGrpSpPr>
+      <p:grpSpPr>
+        <a:xfrm>
+          <a:off x="0" y="0"/>
+          <a:ext cx="0" cy="0"/>
+          <a:chOff x="0" y="0"/>
+          <a:chExt cx="0" cy="0"/>
+        </a:xfrm>
+      </p:grpSpPr>
+      <p:sp>
+        <p:nvSpPr>
+          <p:cNvPr id="2" name="Slide Image Placeholder 1"/>
+          <p:cNvSpPr>
+            <a:spLocks noGrp="1" noRot="1" noChangeAspect="1"/>
+          </p:cNvSpPr>
+          <p:nvPr>
+            <p:ph type="sldImg"/>
+          </p:nvPr>
+        </p:nvSpPr>
+        <p:spPr/>
+      </p:sp>
+      <p:sp>
+        <p:nvSpPr>
+          <p:cNvPr id="3" name="Notes Placeholder 2"/>
+          <p:cNvSpPr>
+            <a:spLocks noGrp="1"/>
+          </p:cNvSpPr>
+          <p:nvPr>
+            <p:ph type="body" idx="1"/>
+          </p:nvPr>
+        </p:nvSpPr>
+        <p:spPr/>
+        <p:txBody>
+          <a:bodyPr/>
+          <a:lstStyle/>
+          <a:p>
+            <a:endParaRPr lang="en-DE" dirty="0"/>
+          </a:p>
+        </p:txBody>
+      </p:sp>
+      <p:sp>
+        <p:nvSpPr>
+          <p:cNvPr id="4" name="Slide Number Placeholder 3"/>
+          <p:cNvSpPr>
+            <a:spLocks noGrp="1"/>
+          </p:cNvSpPr>
+          <p:nvPr>
+            <p:ph type="sldNum" sz="quarter" idx="5"/>
+          </p:nvPr>
+        </p:nvSpPr>
+        <p:spPr/>
+        <p:txBody>
+          <a:bodyPr/>
+          <a:lstStyle/>
+          <a:p>
+            <a:fld id="{998EAD06-FB11-B344-9F2A-AF629020CFA6}" type="slidenum">
+              <a:rPr lang="en-DE" smtClean="0"/>
+              <a:t>1</a:t>
+            </a:fld>
+            <a:endParaRPr lang="en-DE"/>
+          </a:p>
+        </p:txBody>
+      </p:sp>
+    </p:spTree>
+    <p:extLst>
+      <p:ext uri="{BB962C8B-B14F-4D97-AF65-F5344CB8AC3E}">
+        <p14:creationId xmlns:p14="http://schemas.microsoft.com/office/powerpoint/2010/main" val="2303153604"/>
+      </p:ext>
+    </p:extLst>
+  </p:cSld>
+  <p:clrMapOvr>
+    <a:masterClrMapping/>
+  </p:clrMapOvr>
+</p:notes>
 </file>
 
 <file path=ppt/slideLayouts/slideLayout1.xml><?xml version="1.0" encoding="utf-8"?>
@@ -4272,10 +4359,10 @@
           <p:nvPr/>
         </p:nvPicPr>
         <p:blipFill>
-          <a:blip r:embed="rId2">
+          <a:blip r:embed="rId3">
             <a:extLst>
               <a:ext uri="{96DAC541-7B7A-43D3-8B79-37D633B846F1}">
-                <asvg:svgBlip xmlns:asvg="http://schemas.microsoft.com/office/drawing/2016/SVG/main" r:embed="rId3"/>
+                <asvg:svgBlip xmlns:asvg="http://schemas.microsoft.com/office/drawing/2016/SVG/main" r:embed="rId4"/>
               </a:ext>
             </a:extLst>
           </a:blip>
@@ -4798,7 +4885,7 @@
           <a:lstStyle/>
           <a:p>
             <a:r>
-              <a:rPr lang="en-DE" sz="2200" dirty="0">
+              <a:rPr lang="en-DE" dirty="0">
                 <a:latin typeface="+mj-lt"/>
               </a:rPr>
               <a:t>Overview</a:t>
@@ -4807,33 +4894,33 @@
           <a:p>
             <a:pPr lvl="1"/>
             <a:r>
-              <a:rPr lang="en-DE" sz="2200" dirty="0">
+              <a:rPr lang="en-DE" sz="2800" dirty="0">
                 <a:latin typeface="+mj-lt"/>
               </a:rPr>
-              <a:t>What is &amp; Why Helm?</a:t>
+              <a:t>What is Helm?</a:t>
             </a:r>
           </a:p>
           <a:p>
             <a:pPr lvl="1"/>
             <a:r>
-              <a:rPr lang="en-DE" sz="2200" dirty="0">
+              <a:rPr lang="en-DE" sz="2800" dirty="0">
+                <a:latin typeface="+mj-lt"/>
+              </a:rPr>
+              <a:t>Why Helm?</a:t>
+            </a:r>
+          </a:p>
+          <a:p>
+            <a:pPr lvl="1"/>
+            <a:r>
+              <a:rPr lang="en-DE" sz="2800" dirty="0">
                 <a:latin typeface="+mj-lt"/>
               </a:rPr>
               <a:t>What are Charts?</a:t>
             </a:r>
           </a:p>
           <a:p>
-            <a:pPr lvl="1"/>
-            <a:r>
-              <a:rPr lang="en-DE" sz="2200" dirty="0">
-                <a:latin typeface="+mj-lt"/>
-              </a:rPr>
-              <a:t>Bla</a:t>
-            </a:r>
-          </a:p>
-          <a:p>
-            <a:r>
-              <a:rPr lang="en-DE" sz="2200" dirty="0">
+            <a:r>
+              <a:rPr lang="en-DE" dirty="0">
                 <a:latin typeface="+mj-lt"/>
               </a:rPr>
               <a:t>Hands-on Demo</a:t>
@@ -4842,7 +4929,7 @@
           <a:p>
             <a:pPr lvl="1"/>
             <a:r>
-              <a:rPr lang="en-DE" sz="2200" dirty="0">
+              <a:rPr lang="en-DE" sz="2800" dirty="0">
                 <a:latin typeface="+mj-lt"/>
               </a:rPr>
               <a:t>Create an Helm Chart</a:t>
@@ -4851,7 +4938,7 @@
           <a:p>
             <a:pPr lvl="1"/>
             <a:r>
-              <a:rPr lang="en-DE" sz="2200" dirty="0">
+              <a:rPr lang="en-DE" sz="2800" dirty="0">
                 <a:latin typeface="+mj-lt"/>
               </a:rPr>
               <a:t>Deploy an Helm Chart</a:t>
@@ -4859,7 +4946,7 @@
           </a:p>
           <a:p>
             <a:r>
-              <a:rPr lang="en-DE" sz="2200" dirty="0">
+              <a:rPr lang="en-DE" dirty="0">
                 <a:latin typeface="+mj-lt"/>
               </a:rPr>
               <a:t>Source Code</a:t>
@@ -4868,48 +4955,48 @@
           <a:p>
             <a:pPr lvl="1"/>
             <a:r>
-              <a:rPr lang="en-GB" sz="1800" dirty="0">
+              <a:rPr lang="en-GB" dirty="0">
                 <a:latin typeface="+mj-lt"/>
                 <a:hlinkClick r:id="rId2"/>
               </a:rPr>
               <a:t>https://</a:t>
             </a:r>
             <a:r>
-              <a:rPr lang="en-GB" sz="1800" dirty="0" err="1">
+              <a:rPr lang="en-GB" dirty="0" err="1">
                 <a:latin typeface="+mj-lt"/>
                 <a:hlinkClick r:id="rId2"/>
               </a:rPr>
               <a:t>github.com</a:t>
             </a:r>
             <a:r>
-              <a:rPr lang="en-GB" sz="1800" dirty="0">
+              <a:rPr lang="en-GB" dirty="0">
                 <a:latin typeface="+mj-lt"/>
                 <a:hlinkClick r:id="rId2"/>
               </a:rPr>
               <a:t>/</a:t>
             </a:r>
             <a:r>
-              <a:rPr lang="en-GB" sz="1800" dirty="0" err="1">
+              <a:rPr lang="en-GB" dirty="0" err="1">
                 <a:latin typeface="+mj-lt"/>
                 <a:hlinkClick r:id="rId2"/>
               </a:rPr>
               <a:t>StiviiK</a:t>
             </a:r>
             <a:r>
-              <a:rPr lang="en-GB" sz="1800" dirty="0">
+              <a:rPr lang="en-GB" dirty="0">
                 <a:latin typeface="+mj-lt"/>
                 <a:hlinkClick r:id="rId2"/>
               </a:rPr>
               <a:t>/helm-</a:t>
             </a:r>
             <a:r>
-              <a:rPr lang="en-GB" sz="1800" dirty="0" err="1">
+              <a:rPr lang="en-GB" dirty="0" err="1">
                 <a:latin typeface="+mj-lt"/>
                 <a:hlinkClick r:id="rId2"/>
               </a:rPr>
               <a:t>handson</a:t>
             </a:r>
-            <a:endParaRPr lang="en-DE" sz="1800" dirty="0">
+            <a:endParaRPr lang="en-DE" dirty="0">
               <a:latin typeface="+mj-lt"/>
             </a:endParaRPr>
           </a:p>
@@ -5083,8 +5170,8 @@
           <a:lstStyle/>
           <a:p>
             <a:r>
-              <a:rPr lang="en-DE" sz="5400"/>
-              <a:t>What is &amp; Why Helm?</a:t>
+              <a:rPr lang="en-DE" sz="5400" dirty="0"/>
+              <a:t>What is Helm?</a:t>
             </a:r>
           </a:p>
         </p:txBody>
@@ -5756,11 +5843,102 @@
           <a:lstStyle/>
           <a:p>
             <a:r>
-              <a:rPr lang="en-DE" sz="2200">
+              <a:rPr lang="en-DE" sz="2600" dirty="0">
                 <a:latin typeface="+mj-lt"/>
               </a:rPr>
-              <a:t>cgdfg</a:t>
-            </a:r>
+              <a:t>”Helm is the best way to find, share, and user software built for Kubernetes” – </a:t>
+            </a:r>
+            <a:r>
+              <a:rPr lang="en-DE" sz="2600" dirty="0">
+                <a:latin typeface="+mj-lt"/>
+                <a:hlinkClick r:id="rId2">
+                  <a:extLst>
+                    <a:ext uri="{A12FA001-AC4F-418D-AE19-62706E023703}">
+                      <ahyp:hlinkClr xmlns:ahyp="http://schemas.microsoft.com/office/drawing/2018/hyperlinkcolor" val="tx"/>
+                    </a:ext>
+                  </a:extLst>
+                </a:hlinkClick>
+              </a:rPr>
+              <a:t>helm.sh</a:t>
+            </a:r>
+            <a:endParaRPr lang="en-DE" sz="2600" dirty="0">
+              <a:latin typeface="+mj-lt"/>
+            </a:endParaRPr>
+          </a:p>
+          <a:p>
+            <a:endParaRPr lang="en-DE" sz="2600" dirty="0">
+              <a:latin typeface="+mj-lt"/>
+            </a:endParaRPr>
+          </a:p>
+          <a:p>
+            <a:endParaRPr lang="en-DE" sz="2600" dirty="0">
+              <a:latin typeface="+mj-lt"/>
+            </a:endParaRPr>
+          </a:p>
+          <a:p>
+            <a:endParaRPr lang="en-DE" sz="2600" dirty="0">
+              <a:latin typeface="+mj-lt"/>
+            </a:endParaRPr>
+          </a:p>
+          <a:p>
+            <a:r>
+              <a:rPr lang="en-DE" sz="2600" dirty="0">
+                <a:latin typeface="+mj-lt"/>
+              </a:rPr>
+              <a:t>Community</a:t>
+            </a:r>
+          </a:p>
+          <a:p>
+            <a:pPr lvl="1"/>
+            <a:r>
+              <a:rPr lang="en-DE" sz="2200" dirty="0">
+                <a:latin typeface="+mj-lt"/>
+              </a:rPr>
+              <a:t>First commit October 19, 2015</a:t>
+            </a:r>
+          </a:p>
+          <a:p>
+            <a:pPr lvl="1"/>
+            <a:r>
+              <a:rPr lang="en-DE" sz="2200" dirty="0">
+                <a:latin typeface="+mj-lt"/>
+              </a:rPr>
+              <a:t>500+ contributers</a:t>
+            </a:r>
+          </a:p>
+          <a:p>
+            <a:pPr lvl="1"/>
+            <a:r>
+              <a:rPr lang="en-DE" sz="2200" dirty="0">
+                <a:latin typeface="+mj-lt"/>
+              </a:rPr>
+              <a:t>6K+ code commits</a:t>
+            </a:r>
+          </a:p>
+          <a:p>
+            <a:pPr lvl="1"/>
+            <a:r>
+              <a:rPr lang="en-DE" sz="2200" dirty="0">
+                <a:latin typeface="+mj-lt"/>
+              </a:rPr>
+              <a:t>20,6k stars on GitHub</a:t>
+            </a:r>
+            <a:endParaRPr lang="en-DE" sz="2600" dirty="0">
+              <a:latin typeface="+mj-lt"/>
+            </a:endParaRPr>
+          </a:p>
+          <a:p>
+            <a:pPr marL="0" indent="0">
+              <a:buNone/>
+            </a:pPr>
+            <a:endParaRPr lang="en-DE" sz="2600" dirty="0">
+              <a:latin typeface="+mj-lt"/>
+            </a:endParaRPr>
+          </a:p>
+          <a:p>
+            <a:endParaRPr lang="en-DE" sz="2200" dirty="0">
+              <a:latin typeface="+mj-lt"/>
+            </a:endParaRPr>
           </a:p>
         </p:txBody>
       </p:sp>
@@ -5809,6 +5987,2316 @@
     <p:extLst>
       <p:ext uri="{BB962C8B-B14F-4D97-AF65-F5344CB8AC3E}">
         <p14:creationId xmlns:p14="http://schemas.microsoft.com/office/powerpoint/2010/main" val="3124740894"/>
+      </p:ext>
+    </p:extLst>
+  </p:cSld>
+  <p:clrMapOvr>
+    <a:masterClrMapping/>
+  </p:clrMapOvr>
+</p:sld>
+</file>
+
+<file path=ppt/slides/slide4.xml><?xml version="1.0" encoding="utf-8"?>
+<p:sld xmlns:a="http://schemas.openxmlformats.org/drawingml/2006/main" xmlns:r="http://schemas.openxmlformats.org/officeDocument/2006/relationships" xmlns:p="http://schemas.openxmlformats.org/presentationml/2006/main">
+  <p:cSld>
+    <p:bg>
+      <p:bgPr>
+        <a:solidFill>
+          <a:schemeClr val="bg1"/>
+        </a:solidFill>
+        <a:effectLst/>
+      </p:bgPr>
+    </p:bg>
+    <p:spTree>
+      <p:nvGrpSpPr>
+        <p:cNvPr id="1" name=""/>
+        <p:cNvGrpSpPr/>
+        <p:nvPr/>
+      </p:nvGrpSpPr>
+      <p:grpSpPr>
+        <a:xfrm>
+          <a:off x="0" y="0"/>
+          <a:ext cx="0" cy="0"/>
+          <a:chOff x="0" y="0"/>
+          <a:chExt cx="0" cy="0"/>
+        </a:xfrm>
+      </p:grpSpPr>
+      <p:sp useBgFill="1">
+        <p:nvSpPr>
+          <p:cNvPr id="22" name="Rectangle 21">
+            <a:extLst>
+              <a:ext uri="{FF2B5EF4-FFF2-40B4-BE49-F238E27FC236}">
+                <a16:creationId xmlns:a16="http://schemas.microsoft.com/office/drawing/2014/main" id="{100EDD19-6802-4EC3-95CE-CFFAB042CFD6}"/>
+              </a:ext>
+              <a:ext uri="{C183D7F6-B498-43B3-948B-1728B52AA6E4}">
+                <adec:decorative xmlns:adec="http://schemas.microsoft.com/office/drawing/2017/decorative" val="1"/>
+              </a:ext>
+            </a:extLst>
+          </p:cNvPr>
+          <p:cNvSpPr>
+            <a:spLocks noGrp="1" noRot="1" noChangeAspect="1" noMove="1" noResize="1" noEditPoints="1" noAdjustHandles="1" noChangeArrowheads="1" noChangeShapeType="1" noTextEdit="1"/>
+          </p:cNvSpPr>
+          <p:nvPr>
+            <p:extLst>
+              <p:ext uri="{386F3935-93C4-4BCD-93E2-E3B085C9AB24}">
+                <p16:designElem xmlns:p16="http://schemas.microsoft.com/office/powerpoint/2015/main" val="1"/>
+              </p:ext>
+            </p:extLst>
+          </p:nvPr>
+        </p:nvSpPr>
+        <p:spPr>
+          <a:xfrm>
+            <a:off x="0" y="0"/>
+            <a:ext cx="12188952" cy="6858000"/>
+          </a:xfrm>
+          <a:prstGeom prst="rect">
+            <a:avLst/>
+          </a:prstGeom>
+          <a:ln>
+            <a:noFill/>
+          </a:ln>
+        </p:spPr>
+        <p:style>
+          <a:lnRef idx="2">
+            <a:schemeClr val="accent1">
+              <a:shade val="50000"/>
+            </a:schemeClr>
+          </a:lnRef>
+          <a:fillRef idx="1">
+            <a:schemeClr val="accent1"/>
+          </a:fillRef>
+          <a:effectRef idx="0">
+            <a:schemeClr val="accent1"/>
+          </a:effectRef>
+          <a:fontRef idx="minor">
+            <a:schemeClr val="lt1"/>
+          </a:fontRef>
+        </p:style>
+        <p:txBody>
+          <a:bodyPr rtlCol="0" anchor="ctr"/>
+          <a:lstStyle/>
+          <a:p>
+            <a:pPr algn="ctr"/>
+            <a:endParaRPr lang="en-US"/>
+          </a:p>
+        </p:txBody>
+      </p:sp>
+      <p:sp>
+        <p:nvSpPr>
+          <p:cNvPr id="2" name="Title 1">
+            <a:extLst>
+              <a:ext uri="{FF2B5EF4-FFF2-40B4-BE49-F238E27FC236}">
+                <a16:creationId xmlns:a16="http://schemas.microsoft.com/office/drawing/2014/main" id="{7C6AFD45-E7B3-5F45-9F30-453710277085}"/>
+              </a:ext>
+            </a:extLst>
+          </p:cNvPr>
+          <p:cNvSpPr>
+            <a:spLocks noGrp="1"/>
+          </p:cNvSpPr>
+          <p:nvPr>
+            <p:ph type="title"/>
+          </p:nvPr>
+        </p:nvSpPr>
+        <p:spPr>
+          <a:xfrm>
+            <a:off x="838200" y="365125"/>
+            <a:ext cx="10515600" cy="1325563"/>
+          </a:xfrm>
+        </p:spPr>
+        <p:txBody>
+          <a:bodyPr>
+            <a:normAutofit/>
+          </a:bodyPr>
+          <a:lstStyle/>
+          <a:p>
+            <a:r>
+              <a:rPr lang="en-DE" sz="5400" dirty="0"/>
+              <a:t>Why Helm?</a:t>
+            </a:r>
+          </a:p>
+        </p:txBody>
+      </p:sp>
+      <p:sp>
+        <p:nvSpPr>
+          <p:cNvPr id="24" name="sketch line">
+            <a:extLst>
+              <a:ext uri="{FF2B5EF4-FFF2-40B4-BE49-F238E27FC236}">
+                <a16:creationId xmlns:a16="http://schemas.microsoft.com/office/drawing/2014/main" id="{DB17E863-922E-4C26-BD64-E8FD41D28661}"/>
+              </a:ext>
+              <a:ext uri="{C183D7F6-B498-43B3-948B-1728B52AA6E4}">
+                <adec:decorative xmlns:adec="http://schemas.microsoft.com/office/drawing/2017/decorative" val="1"/>
+              </a:ext>
+            </a:extLst>
+          </p:cNvPr>
+          <p:cNvSpPr>
+            <a:spLocks noGrp="1" noRot="1" noChangeAspect="1" noMove="1" noResize="1" noEditPoints="1" noAdjustHandles="1" noChangeArrowheads="1" noChangeShapeType="1" noTextEdit="1"/>
+          </p:cNvSpPr>
+          <p:nvPr>
+            <p:extLst>
+              <p:ext uri="{386F3935-93C4-4BCD-93E2-E3B085C9AB24}">
+                <p16:designElem xmlns:p16="http://schemas.microsoft.com/office/powerpoint/2015/main" val="1"/>
+              </p:ext>
+            </p:extLst>
+          </p:nvPr>
+        </p:nvSpPr>
+        <p:spPr>
+          <a:xfrm>
+            <a:off x="669036" y="1677373"/>
+            <a:ext cx="10853928" cy="18288"/>
+          </a:xfrm>
+          <a:custGeom>
+            <a:avLst/>
+            <a:gdLst>
+              <a:gd name="connsiteX0" fmla="*/ 0 w 10853928"/>
+              <a:gd name="connsiteY0" fmla="*/ 0 h 18288"/>
+              <a:gd name="connsiteX1" fmla="*/ 461292 w 10853928"/>
+              <a:gd name="connsiteY1" fmla="*/ 0 h 18288"/>
+              <a:gd name="connsiteX2" fmla="*/ 1139662 w 10853928"/>
+              <a:gd name="connsiteY2" fmla="*/ 0 h 18288"/>
+              <a:gd name="connsiteX3" fmla="*/ 1926572 w 10853928"/>
+              <a:gd name="connsiteY3" fmla="*/ 0 h 18288"/>
+              <a:gd name="connsiteX4" fmla="*/ 2279325 w 10853928"/>
+              <a:gd name="connsiteY4" fmla="*/ 0 h 18288"/>
+              <a:gd name="connsiteX5" fmla="*/ 2632078 w 10853928"/>
+              <a:gd name="connsiteY5" fmla="*/ 0 h 18288"/>
+              <a:gd name="connsiteX6" fmla="*/ 3527527 w 10853928"/>
+              <a:gd name="connsiteY6" fmla="*/ 0 h 18288"/>
+              <a:gd name="connsiteX7" fmla="*/ 4205897 w 10853928"/>
+              <a:gd name="connsiteY7" fmla="*/ 0 h 18288"/>
+              <a:gd name="connsiteX8" fmla="*/ 4558650 w 10853928"/>
+              <a:gd name="connsiteY8" fmla="*/ 0 h 18288"/>
+              <a:gd name="connsiteX9" fmla="*/ 5237020 w 10853928"/>
+              <a:gd name="connsiteY9" fmla="*/ 0 h 18288"/>
+              <a:gd name="connsiteX10" fmla="*/ 6132469 w 10853928"/>
+              <a:gd name="connsiteY10" fmla="*/ 0 h 18288"/>
+              <a:gd name="connsiteX11" fmla="*/ 6702301 w 10853928"/>
+              <a:gd name="connsiteY11" fmla="*/ 0 h 18288"/>
+              <a:gd name="connsiteX12" fmla="*/ 7272132 w 10853928"/>
+              <a:gd name="connsiteY12" fmla="*/ 0 h 18288"/>
+              <a:gd name="connsiteX13" fmla="*/ 7950502 w 10853928"/>
+              <a:gd name="connsiteY13" fmla="*/ 0 h 18288"/>
+              <a:gd name="connsiteX14" fmla="*/ 8737412 w 10853928"/>
+              <a:gd name="connsiteY14" fmla="*/ 0 h 18288"/>
+              <a:gd name="connsiteX15" fmla="*/ 9524322 w 10853928"/>
+              <a:gd name="connsiteY15" fmla="*/ 0 h 18288"/>
+              <a:gd name="connsiteX16" fmla="*/ 10853928 w 10853928"/>
+              <a:gd name="connsiteY16" fmla="*/ 0 h 18288"/>
+              <a:gd name="connsiteX17" fmla="*/ 10853928 w 10853928"/>
+              <a:gd name="connsiteY17" fmla="*/ 18288 h 18288"/>
+              <a:gd name="connsiteX18" fmla="*/ 10392636 w 10853928"/>
+              <a:gd name="connsiteY18" fmla="*/ 18288 h 18288"/>
+              <a:gd name="connsiteX19" fmla="*/ 9497187 w 10853928"/>
+              <a:gd name="connsiteY19" fmla="*/ 18288 h 18288"/>
+              <a:gd name="connsiteX20" fmla="*/ 8818817 w 10853928"/>
+              <a:gd name="connsiteY20" fmla="*/ 18288 h 18288"/>
+              <a:gd name="connsiteX21" fmla="*/ 8466064 w 10853928"/>
+              <a:gd name="connsiteY21" fmla="*/ 18288 h 18288"/>
+              <a:gd name="connsiteX22" fmla="*/ 7787693 w 10853928"/>
+              <a:gd name="connsiteY22" fmla="*/ 18288 h 18288"/>
+              <a:gd name="connsiteX23" fmla="*/ 7217862 w 10853928"/>
+              <a:gd name="connsiteY23" fmla="*/ 18288 h 18288"/>
+              <a:gd name="connsiteX24" fmla="*/ 6648031 w 10853928"/>
+              <a:gd name="connsiteY24" fmla="*/ 18288 h 18288"/>
+              <a:gd name="connsiteX25" fmla="*/ 6078200 w 10853928"/>
+              <a:gd name="connsiteY25" fmla="*/ 18288 h 18288"/>
+              <a:gd name="connsiteX26" fmla="*/ 5508368 w 10853928"/>
+              <a:gd name="connsiteY26" fmla="*/ 18288 h 18288"/>
+              <a:gd name="connsiteX27" fmla="*/ 4721459 w 10853928"/>
+              <a:gd name="connsiteY27" fmla="*/ 18288 h 18288"/>
+              <a:gd name="connsiteX28" fmla="*/ 4043088 w 10853928"/>
+              <a:gd name="connsiteY28" fmla="*/ 18288 h 18288"/>
+              <a:gd name="connsiteX29" fmla="*/ 3690336 w 10853928"/>
+              <a:gd name="connsiteY29" fmla="*/ 18288 h 18288"/>
+              <a:gd name="connsiteX30" fmla="*/ 3120504 w 10853928"/>
+              <a:gd name="connsiteY30" fmla="*/ 18288 h 18288"/>
+              <a:gd name="connsiteX31" fmla="*/ 2333595 w 10853928"/>
+              <a:gd name="connsiteY31" fmla="*/ 18288 h 18288"/>
+              <a:gd name="connsiteX32" fmla="*/ 1872303 w 10853928"/>
+              <a:gd name="connsiteY32" fmla="*/ 18288 h 18288"/>
+              <a:gd name="connsiteX33" fmla="*/ 976854 w 10853928"/>
+              <a:gd name="connsiteY33" fmla="*/ 18288 h 18288"/>
+              <a:gd name="connsiteX34" fmla="*/ 0 w 10853928"/>
+              <a:gd name="connsiteY34" fmla="*/ 18288 h 18288"/>
+              <a:gd name="connsiteX35" fmla="*/ 0 w 10853928"/>
+              <a:gd name="connsiteY35" fmla="*/ 0 h 18288"/>
+            </a:gdLst>
+            <a:ahLst/>
+            <a:cxnLst>
+              <a:cxn ang="0">
+                <a:pos x="connsiteX0" y="connsiteY0"/>
+              </a:cxn>
+              <a:cxn ang="0">
+                <a:pos x="connsiteX1" y="connsiteY1"/>
+              </a:cxn>
+              <a:cxn ang="0">
+                <a:pos x="connsiteX2" y="connsiteY2"/>
+              </a:cxn>
+              <a:cxn ang="0">
+                <a:pos x="connsiteX3" y="connsiteY3"/>
+              </a:cxn>
+              <a:cxn ang="0">
+                <a:pos x="connsiteX4" y="connsiteY4"/>
+              </a:cxn>
+              <a:cxn ang="0">
+                <a:pos x="connsiteX5" y="connsiteY5"/>
+              </a:cxn>
+              <a:cxn ang="0">
+                <a:pos x="connsiteX6" y="connsiteY6"/>
+              </a:cxn>
+              <a:cxn ang="0">
+                <a:pos x="connsiteX7" y="connsiteY7"/>
+              </a:cxn>
+              <a:cxn ang="0">
+                <a:pos x="connsiteX8" y="connsiteY8"/>
+              </a:cxn>
+              <a:cxn ang="0">
+                <a:pos x="connsiteX9" y="connsiteY9"/>
+              </a:cxn>
+              <a:cxn ang="0">
+                <a:pos x="connsiteX10" y="connsiteY10"/>
+              </a:cxn>
+              <a:cxn ang="0">
+                <a:pos x="connsiteX11" y="connsiteY11"/>
+              </a:cxn>
+              <a:cxn ang="0">
+                <a:pos x="connsiteX12" y="connsiteY12"/>
+              </a:cxn>
+              <a:cxn ang="0">
+                <a:pos x="connsiteX13" y="connsiteY13"/>
+              </a:cxn>
+              <a:cxn ang="0">
+                <a:pos x="connsiteX14" y="connsiteY14"/>
+              </a:cxn>
+              <a:cxn ang="0">
+                <a:pos x="connsiteX15" y="connsiteY15"/>
+              </a:cxn>
+              <a:cxn ang="0">
+                <a:pos x="connsiteX16" y="connsiteY16"/>
+              </a:cxn>
+              <a:cxn ang="0">
+                <a:pos x="connsiteX17" y="connsiteY17"/>
+              </a:cxn>
+              <a:cxn ang="0">
+                <a:pos x="connsiteX18" y="connsiteY18"/>
+              </a:cxn>
+              <a:cxn ang="0">
+                <a:pos x="connsiteX19" y="connsiteY19"/>
+              </a:cxn>
+              <a:cxn ang="0">
+                <a:pos x="connsiteX20" y="connsiteY20"/>
+              </a:cxn>
+              <a:cxn ang="0">
+                <a:pos x="connsiteX21" y="connsiteY21"/>
+              </a:cxn>
+              <a:cxn ang="0">
+                <a:pos x="connsiteX22" y="connsiteY22"/>
+              </a:cxn>
+              <a:cxn ang="0">
+                <a:pos x="connsiteX23" y="connsiteY23"/>
+              </a:cxn>
+              <a:cxn ang="0">
+                <a:pos x="connsiteX24" y="connsiteY24"/>
+              </a:cxn>
+              <a:cxn ang="0">
+                <a:pos x="connsiteX25" y="connsiteY25"/>
+              </a:cxn>
+              <a:cxn ang="0">
+                <a:pos x="connsiteX26" y="connsiteY26"/>
+              </a:cxn>
+              <a:cxn ang="0">
+                <a:pos x="connsiteX27" y="connsiteY27"/>
+              </a:cxn>
+              <a:cxn ang="0">
+                <a:pos x="connsiteX28" y="connsiteY28"/>
+              </a:cxn>
+              <a:cxn ang="0">
+                <a:pos x="connsiteX29" y="connsiteY29"/>
+              </a:cxn>
+              <a:cxn ang="0">
+                <a:pos x="connsiteX30" y="connsiteY30"/>
+              </a:cxn>
+              <a:cxn ang="0">
+                <a:pos x="connsiteX31" y="connsiteY31"/>
+              </a:cxn>
+              <a:cxn ang="0">
+                <a:pos x="connsiteX32" y="connsiteY32"/>
+              </a:cxn>
+              <a:cxn ang="0">
+                <a:pos x="connsiteX33" y="connsiteY33"/>
+              </a:cxn>
+              <a:cxn ang="0">
+                <a:pos x="connsiteX34" y="connsiteY34"/>
+              </a:cxn>
+              <a:cxn ang="0">
+                <a:pos x="connsiteX35" y="connsiteY35"/>
+              </a:cxn>
+            </a:cxnLst>
+            <a:rect l="l" t="t" r="r" b="b"/>
+            <a:pathLst>
+              <a:path w="10853928" h="18288" fill="none" extrusionOk="0">
+                <a:moveTo>
+                  <a:pt x="0" y="0"/>
+                </a:moveTo>
+                <a:cubicBezTo>
+                  <a:pt x="146993" y="-19076"/>
+                  <a:pt x="347684" y="-4790"/>
+                  <a:pt x="461292" y="0"/>
+                </a:cubicBezTo>
+                <a:cubicBezTo>
+                  <a:pt x="574900" y="4790"/>
+                  <a:pt x="808367" y="19821"/>
+                  <a:pt x="1139662" y="0"/>
+                </a:cubicBezTo>
+                <a:cubicBezTo>
+                  <a:pt x="1470957" y="-19821"/>
+                  <a:pt x="1627405" y="5721"/>
+                  <a:pt x="1926572" y="0"/>
+                </a:cubicBezTo>
+                <a:cubicBezTo>
+                  <a:pt x="2225739" y="-5721"/>
+                  <a:pt x="2137730" y="-3235"/>
+                  <a:pt x="2279325" y="0"/>
+                </a:cubicBezTo>
+                <a:cubicBezTo>
+                  <a:pt x="2420920" y="3235"/>
+                  <a:pt x="2456518" y="9685"/>
+                  <a:pt x="2632078" y="0"/>
+                </a:cubicBezTo>
+                <a:cubicBezTo>
+                  <a:pt x="2807638" y="-9685"/>
+                  <a:pt x="3211516" y="-43007"/>
+                  <a:pt x="3527527" y="0"/>
+                </a:cubicBezTo>
+                <a:cubicBezTo>
+                  <a:pt x="3843538" y="43007"/>
+                  <a:pt x="4058833" y="22042"/>
+                  <a:pt x="4205897" y="0"/>
+                </a:cubicBezTo>
+                <a:cubicBezTo>
+                  <a:pt x="4352961" y="-22042"/>
+                  <a:pt x="4474805" y="-11846"/>
+                  <a:pt x="4558650" y="0"/>
+                </a:cubicBezTo>
+                <a:cubicBezTo>
+                  <a:pt x="4642495" y="11846"/>
+                  <a:pt x="5041928" y="-6069"/>
+                  <a:pt x="5237020" y="0"/>
+                </a:cubicBezTo>
+                <a:cubicBezTo>
+                  <a:pt x="5432112" y="6069"/>
+                  <a:pt x="5943266" y="-17479"/>
+                  <a:pt x="6132469" y="0"/>
+                </a:cubicBezTo>
+                <a:cubicBezTo>
+                  <a:pt x="6321672" y="17479"/>
+                  <a:pt x="6483872" y="26234"/>
+                  <a:pt x="6702301" y="0"/>
+                </a:cubicBezTo>
+                <a:cubicBezTo>
+                  <a:pt x="6920730" y="-26234"/>
+                  <a:pt x="6991194" y="-15156"/>
+                  <a:pt x="7272132" y="0"/>
+                </a:cubicBezTo>
+                <a:cubicBezTo>
+                  <a:pt x="7553070" y="15156"/>
+                  <a:pt x="7684444" y="-32961"/>
+                  <a:pt x="7950502" y="0"/>
+                </a:cubicBezTo>
+                <a:cubicBezTo>
+                  <a:pt x="8216560" y="32961"/>
+                  <a:pt x="8493290" y="-10491"/>
+                  <a:pt x="8737412" y="0"/>
+                </a:cubicBezTo>
+                <a:cubicBezTo>
+                  <a:pt x="8981534" y="10491"/>
+                  <a:pt x="9191586" y="-13899"/>
+                  <a:pt x="9524322" y="0"/>
+                </a:cubicBezTo>
+                <a:cubicBezTo>
+                  <a:pt x="9857058" y="13899"/>
+                  <a:pt x="10297509" y="7485"/>
+                  <a:pt x="10853928" y="0"/>
+                </a:cubicBezTo>
+                <a:cubicBezTo>
+                  <a:pt x="10854574" y="4451"/>
+                  <a:pt x="10854418" y="9226"/>
+                  <a:pt x="10853928" y="18288"/>
+                </a:cubicBezTo>
+                <a:cubicBezTo>
+                  <a:pt x="10691638" y="28522"/>
+                  <a:pt x="10574319" y="29578"/>
+                  <a:pt x="10392636" y="18288"/>
+                </a:cubicBezTo>
+                <a:cubicBezTo>
+                  <a:pt x="10210953" y="6998"/>
+                  <a:pt x="9836277" y="-16742"/>
+                  <a:pt x="9497187" y="18288"/>
+                </a:cubicBezTo>
+                <a:cubicBezTo>
+                  <a:pt x="9158097" y="53318"/>
+                  <a:pt x="9119479" y="30714"/>
+                  <a:pt x="8818817" y="18288"/>
+                </a:cubicBezTo>
+                <a:cubicBezTo>
+                  <a:pt x="8518155" y="5863"/>
+                  <a:pt x="8640037" y="6483"/>
+                  <a:pt x="8466064" y="18288"/>
+                </a:cubicBezTo>
+                <a:cubicBezTo>
+                  <a:pt x="8292091" y="30093"/>
+                  <a:pt x="7997656" y="18914"/>
+                  <a:pt x="7787693" y="18288"/>
+                </a:cubicBezTo>
+                <a:cubicBezTo>
+                  <a:pt x="7577730" y="17662"/>
+                  <a:pt x="7412468" y="21416"/>
+                  <a:pt x="7217862" y="18288"/>
+                </a:cubicBezTo>
+                <a:cubicBezTo>
+                  <a:pt x="7023256" y="15160"/>
+                  <a:pt x="6898018" y="14824"/>
+                  <a:pt x="6648031" y="18288"/>
+                </a:cubicBezTo>
+                <a:cubicBezTo>
+                  <a:pt x="6398044" y="21752"/>
+                  <a:pt x="6254402" y="38625"/>
+                  <a:pt x="6078200" y="18288"/>
+                </a:cubicBezTo>
+                <a:cubicBezTo>
+                  <a:pt x="5901998" y="-2049"/>
+                  <a:pt x="5622886" y="3213"/>
+                  <a:pt x="5508368" y="18288"/>
+                </a:cubicBezTo>
+                <a:cubicBezTo>
+                  <a:pt x="5393850" y="33363"/>
+                  <a:pt x="5036260" y="26830"/>
+                  <a:pt x="4721459" y="18288"/>
+                </a:cubicBezTo>
+                <a:cubicBezTo>
+                  <a:pt x="4406658" y="9746"/>
+                  <a:pt x="4239221" y="41551"/>
+                  <a:pt x="4043088" y="18288"/>
+                </a:cubicBezTo>
+                <a:cubicBezTo>
+                  <a:pt x="3846955" y="-4975"/>
+                  <a:pt x="3818802" y="34658"/>
+                  <a:pt x="3690336" y="18288"/>
+                </a:cubicBezTo>
+                <a:cubicBezTo>
+                  <a:pt x="3561870" y="1918"/>
+                  <a:pt x="3265491" y="42194"/>
+                  <a:pt x="3120504" y="18288"/>
+                </a:cubicBezTo>
+                <a:cubicBezTo>
+                  <a:pt x="2975517" y="-5618"/>
+                  <a:pt x="2720254" y="36673"/>
+                  <a:pt x="2333595" y="18288"/>
+                </a:cubicBezTo>
+                <a:cubicBezTo>
+                  <a:pt x="1946936" y="-97"/>
+                  <a:pt x="2097241" y="5776"/>
+                  <a:pt x="1872303" y="18288"/>
+                </a:cubicBezTo>
+                <a:cubicBezTo>
+                  <a:pt x="1647365" y="30800"/>
+                  <a:pt x="1282708" y="45380"/>
+                  <a:pt x="976854" y="18288"/>
+                </a:cubicBezTo>
+                <a:cubicBezTo>
+                  <a:pt x="671000" y="-8804"/>
+                  <a:pt x="408401" y="-12775"/>
+                  <a:pt x="0" y="18288"/>
+                </a:cubicBezTo>
+                <a:cubicBezTo>
+                  <a:pt x="-213" y="9468"/>
+                  <a:pt x="187" y="4459"/>
+                  <a:pt x="0" y="0"/>
+                </a:cubicBezTo>
+                <a:close/>
+              </a:path>
+              <a:path w="10853928" h="18288" stroke="0" extrusionOk="0">
+                <a:moveTo>
+                  <a:pt x="0" y="0"/>
+                </a:moveTo>
+                <a:cubicBezTo>
+                  <a:pt x="267322" y="15284"/>
+                  <a:pt x="415388" y="-21048"/>
+                  <a:pt x="569831" y="0"/>
+                </a:cubicBezTo>
+                <a:cubicBezTo>
+                  <a:pt x="724274" y="21048"/>
+                  <a:pt x="769333" y="-2353"/>
+                  <a:pt x="922584" y="0"/>
+                </a:cubicBezTo>
+                <a:cubicBezTo>
+                  <a:pt x="1075835" y="2353"/>
+                  <a:pt x="1399490" y="-145"/>
+                  <a:pt x="1818033" y="0"/>
+                </a:cubicBezTo>
+                <a:cubicBezTo>
+                  <a:pt x="2236576" y="145"/>
+                  <a:pt x="2145330" y="5482"/>
+                  <a:pt x="2387864" y="0"/>
+                </a:cubicBezTo>
+                <a:cubicBezTo>
+                  <a:pt x="2630398" y="-5482"/>
+                  <a:pt x="2793207" y="18487"/>
+                  <a:pt x="2957695" y="0"/>
+                </a:cubicBezTo>
+                <a:cubicBezTo>
+                  <a:pt x="3122183" y="-18487"/>
+                  <a:pt x="3579141" y="19003"/>
+                  <a:pt x="3853144" y="0"/>
+                </a:cubicBezTo>
+                <a:cubicBezTo>
+                  <a:pt x="4127147" y="-19003"/>
+                  <a:pt x="4209857" y="12211"/>
+                  <a:pt x="4314436" y="0"/>
+                </a:cubicBezTo>
+                <a:cubicBezTo>
+                  <a:pt x="4419015" y="-12211"/>
+                  <a:pt x="4762459" y="-17220"/>
+                  <a:pt x="5209885" y="0"/>
+                </a:cubicBezTo>
+                <a:cubicBezTo>
+                  <a:pt x="5657311" y="17220"/>
+                  <a:pt x="5692663" y="-3290"/>
+                  <a:pt x="6105335" y="0"/>
+                </a:cubicBezTo>
+                <a:cubicBezTo>
+                  <a:pt x="6518007" y="3290"/>
+                  <a:pt x="6455516" y="-5124"/>
+                  <a:pt x="6783705" y="0"/>
+                </a:cubicBezTo>
+                <a:cubicBezTo>
+                  <a:pt x="7111894" y="5124"/>
+                  <a:pt x="7441941" y="-17829"/>
+                  <a:pt x="7679154" y="0"/>
+                </a:cubicBezTo>
+                <a:cubicBezTo>
+                  <a:pt x="7916367" y="17829"/>
+                  <a:pt x="8102967" y="-24363"/>
+                  <a:pt x="8248985" y="0"/>
+                </a:cubicBezTo>
+                <a:cubicBezTo>
+                  <a:pt x="8395003" y="24363"/>
+                  <a:pt x="8552393" y="25505"/>
+                  <a:pt x="8818817" y="0"/>
+                </a:cubicBezTo>
+                <a:cubicBezTo>
+                  <a:pt x="9085241" y="-25505"/>
+                  <a:pt x="9411308" y="38000"/>
+                  <a:pt x="9605726" y="0"/>
+                </a:cubicBezTo>
+                <a:cubicBezTo>
+                  <a:pt x="9800144" y="-38000"/>
+                  <a:pt x="10006468" y="-25741"/>
+                  <a:pt x="10175558" y="0"/>
+                </a:cubicBezTo>
+                <a:cubicBezTo>
+                  <a:pt x="10344648" y="25741"/>
+                  <a:pt x="10696282" y="695"/>
+                  <a:pt x="10853928" y="0"/>
+                </a:cubicBezTo>
+                <a:cubicBezTo>
+                  <a:pt x="10853521" y="8690"/>
+                  <a:pt x="10853774" y="14141"/>
+                  <a:pt x="10853928" y="18288"/>
+                </a:cubicBezTo>
+                <a:cubicBezTo>
+                  <a:pt x="10608124" y="24255"/>
+                  <a:pt x="10343415" y="22307"/>
+                  <a:pt x="10067018" y="18288"/>
+                </a:cubicBezTo>
+                <a:cubicBezTo>
+                  <a:pt x="9790621" y="14270"/>
+                  <a:pt x="9843266" y="3564"/>
+                  <a:pt x="9714266" y="18288"/>
+                </a:cubicBezTo>
+                <a:cubicBezTo>
+                  <a:pt x="9585266" y="33012"/>
+                  <a:pt x="9379484" y="1875"/>
+                  <a:pt x="9252974" y="18288"/>
+                </a:cubicBezTo>
+                <a:cubicBezTo>
+                  <a:pt x="9126464" y="34701"/>
+                  <a:pt x="8580678" y="-4904"/>
+                  <a:pt x="8357525" y="18288"/>
+                </a:cubicBezTo>
+                <a:cubicBezTo>
+                  <a:pt x="8134372" y="41480"/>
+                  <a:pt x="7903199" y="26458"/>
+                  <a:pt x="7679154" y="18288"/>
+                </a:cubicBezTo>
+                <a:cubicBezTo>
+                  <a:pt x="7455109" y="10118"/>
+                  <a:pt x="7435944" y="27109"/>
+                  <a:pt x="7217862" y="18288"/>
+                </a:cubicBezTo>
+                <a:cubicBezTo>
+                  <a:pt x="6999780" y="9467"/>
+                  <a:pt x="6680409" y="18985"/>
+                  <a:pt x="6539492" y="18288"/>
+                </a:cubicBezTo>
+                <a:cubicBezTo>
+                  <a:pt x="6398575" y="17592"/>
+                  <a:pt x="6312077" y="33018"/>
+                  <a:pt x="6186739" y="18288"/>
+                </a:cubicBezTo>
+                <a:cubicBezTo>
+                  <a:pt x="6061401" y="3558"/>
+                  <a:pt x="5947033" y="12075"/>
+                  <a:pt x="5833986" y="18288"/>
+                </a:cubicBezTo>
+                <a:cubicBezTo>
+                  <a:pt x="5720939" y="24501"/>
+                  <a:pt x="5482226" y="8586"/>
+                  <a:pt x="5155616" y="18288"/>
+                </a:cubicBezTo>
+                <a:cubicBezTo>
+                  <a:pt x="4829006" y="27991"/>
+                  <a:pt x="4841274" y="29316"/>
+                  <a:pt x="4694324" y="18288"/>
+                </a:cubicBezTo>
+                <a:cubicBezTo>
+                  <a:pt x="4547374" y="7260"/>
+                  <a:pt x="4077675" y="7013"/>
+                  <a:pt x="3907414" y="18288"/>
+                </a:cubicBezTo>
+                <a:cubicBezTo>
+                  <a:pt x="3737153" y="29564"/>
+                  <a:pt x="3538393" y="21630"/>
+                  <a:pt x="3446122" y="18288"/>
+                </a:cubicBezTo>
+                <a:cubicBezTo>
+                  <a:pt x="3353851" y="14946"/>
+                  <a:pt x="2990320" y="-8091"/>
+                  <a:pt x="2659212" y="18288"/>
+                </a:cubicBezTo>
+                <a:cubicBezTo>
+                  <a:pt x="2328104" y="44667"/>
+                  <a:pt x="2427653" y="9607"/>
+                  <a:pt x="2306460" y="18288"/>
+                </a:cubicBezTo>
+                <a:cubicBezTo>
+                  <a:pt x="2185267" y="26969"/>
+                  <a:pt x="1719763" y="3717"/>
+                  <a:pt x="1519550" y="18288"/>
+                </a:cubicBezTo>
+                <a:cubicBezTo>
+                  <a:pt x="1319337" y="32860"/>
+                  <a:pt x="1167371" y="17040"/>
+                  <a:pt x="1058258" y="18288"/>
+                </a:cubicBezTo>
+                <a:cubicBezTo>
+                  <a:pt x="949145" y="19536"/>
+                  <a:pt x="780234" y="31447"/>
+                  <a:pt x="705505" y="18288"/>
+                </a:cubicBezTo>
+                <a:cubicBezTo>
+                  <a:pt x="630776" y="5129"/>
+                  <a:pt x="215796" y="30056"/>
+                  <a:pt x="0" y="18288"/>
+                </a:cubicBezTo>
+                <a:cubicBezTo>
+                  <a:pt x="-53" y="11301"/>
+                  <a:pt x="-649" y="7756"/>
+                  <a:pt x="0" y="0"/>
+                </a:cubicBezTo>
+                <a:close/>
+              </a:path>
+            </a:pathLst>
+          </a:custGeom>
+          <a:solidFill>
+            <a:schemeClr val="accent2"/>
+          </a:solidFill>
+          <a:ln w="41275" cap="rnd">
+            <a:solidFill>
+              <a:schemeClr val="accent2"/>
+            </a:solidFill>
+            <a:round/>
+            <a:extLst>
+              <a:ext uri="{C807C97D-BFC1-408E-A445-0C87EB9F89A2}">
+                <ask:lineSketchStyleProps xmlns:ask="http://schemas.microsoft.com/office/drawing/2018/sketchyshapes" sd="1219033472">
+                  <a:prstGeom prst="rect">
+                    <a:avLst/>
+                  </a:prstGeom>
+                  <ask:type>
+                    <ask:lineSketchFreehand/>
+                  </ask:type>
+                </ask:lineSketchStyleProps>
+              </a:ext>
+            </a:extLst>
+          </a:ln>
+        </p:spPr>
+        <p:style>
+          <a:lnRef idx="2">
+            <a:schemeClr val="accent1">
+              <a:shade val="50000"/>
+            </a:schemeClr>
+          </a:lnRef>
+          <a:fillRef idx="1">
+            <a:schemeClr val="accent1"/>
+          </a:fillRef>
+          <a:effectRef idx="0">
+            <a:schemeClr val="accent1"/>
+          </a:effectRef>
+          <a:fontRef idx="minor">
+            <a:schemeClr val="lt1"/>
+          </a:fontRef>
+        </p:style>
+        <p:txBody>
+          <a:bodyPr rtlCol="0" anchor="ctr"/>
+          <a:lstStyle/>
+          <a:p>
+            <a:pPr algn="ctr"/>
+            <a:endParaRPr lang="en-US"/>
+          </a:p>
+        </p:txBody>
+      </p:sp>
+      <p:sp>
+        <p:nvSpPr>
+          <p:cNvPr id="3" name="Content Placeholder 2">
+            <a:extLst>
+              <a:ext uri="{FF2B5EF4-FFF2-40B4-BE49-F238E27FC236}">
+                <a16:creationId xmlns:a16="http://schemas.microsoft.com/office/drawing/2014/main" id="{D2963DD4-BD7B-804A-B6C3-F31858A29F7E}"/>
+              </a:ext>
+            </a:extLst>
+          </p:cNvPr>
+          <p:cNvSpPr>
+            <a:spLocks noGrp="1"/>
+          </p:cNvSpPr>
+          <p:nvPr>
+            <p:ph idx="1"/>
+          </p:nvPr>
+        </p:nvSpPr>
+        <p:spPr>
+          <a:xfrm>
+            <a:off x="838200" y="1929384"/>
+            <a:ext cx="10515600" cy="4251960"/>
+          </a:xfrm>
+        </p:spPr>
+        <p:txBody>
+          <a:bodyPr>
+            <a:normAutofit/>
+          </a:bodyPr>
+          <a:lstStyle/>
+          <a:p>
+            <a:r>
+              <a:rPr lang="en-DE" sz="2200" dirty="0">
+                <a:latin typeface="+mj-lt"/>
+              </a:rPr>
+              <a:t>cgdfg</a:t>
+            </a:r>
+          </a:p>
+        </p:txBody>
+      </p:sp>
+      <p:sp>
+        <p:nvSpPr>
+          <p:cNvPr id="4" name="Footer Placeholder 3">
+            <a:extLst>
+              <a:ext uri="{FF2B5EF4-FFF2-40B4-BE49-F238E27FC236}">
+                <a16:creationId xmlns:a16="http://schemas.microsoft.com/office/drawing/2014/main" id="{F8993BB5-426F-FC49-9AE2-EA5D1AFB000D}"/>
+              </a:ext>
+            </a:extLst>
+          </p:cNvPr>
+          <p:cNvSpPr>
+            <a:spLocks noGrp="1"/>
+          </p:cNvSpPr>
+          <p:nvPr>
+            <p:ph type="ftr" sz="quarter" idx="11"/>
+          </p:nvPr>
+        </p:nvSpPr>
+        <p:spPr>
+          <a:xfrm>
+            <a:off x="4038600" y="6356350"/>
+            <a:ext cx="4114800" cy="365125"/>
+          </a:xfrm>
+        </p:spPr>
+        <p:txBody>
+          <a:bodyPr>
+            <a:normAutofit/>
+          </a:bodyPr>
+          <a:lstStyle/>
+          <a:p>
+            <a:pPr>
+              <a:spcAft>
+                <a:spcPts val="600"/>
+              </a:spcAft>
+            </a:pPr>
+            <a:r>
+              <a:rPr lang="en-GB"/>
+              <a:t>© 2021 Stefan Kürzeder</a:t>
+            </a:r>
+            <a:endParaRPr lang="en-DE"/>
+          </a:p>
+        </p:txBody>
+      </p:sp>
+    </p:spTree>
+    <p:extLst>
+      <p:ext uri="{BB962C8B-B14F-4D97-AF65-F5344CB8AC3E}">
+        <p14:creationId xmlns:p14="http://schemas.microsoft.com/office/powerpoint/2010/main" val="1989660274"/>
+      </p:ext>
+    </p:extLst>
+  </p:cSld>
+  <p:clrMapOvr>
+    <a:masterClrMapping/>
+  </p:clrMapOvr>
+</p:sld>
+</file>
+
+<file path=ppt/slides/slide5.xml><?xml version="1.0" encoding="utf-8"?>
+<p:sld xmlns:a="http://schemas.openxmlformats.org/drawingml/2006/main" xmlns:r="http://schemas.openxmlformats.org/officeDocument/2006/relationships" xmlns:p="http://schemas.openxmlformats.org/presentationml/2006/main">
+  <p:cSld>
+    <p:bg>
+      <p:bgPr>
+        <a:solidFill>
+          <a:schemeClr val="bg1"/>
+        </a:solidFill>
+        <a:effectLst/>
+      </p:bgPr>
+    </p:bg>
+    <p:spTree>
+      <p:nvGrpSpPr>
+        <p:cNvPr id="1" name=""/>
+        <p:cNvGrpSpPr/>
+        <p:nvPr/>
+      </p:nvGrpSpPr>
+      <p:grpSpPr>
+        <a:xfrm>
+          <a:off x="0" y="0"/>
+          <a:ext cx="0" cy="0"/>
+          <a:chOff x="0" y="0"/>
+          <a:chExt cx="0" cy="0"/>
+        </a:xfrm>
+      </p:grpSpPr>
+      <p:sp useBgFill="1">
+        <p:nvSpPr>
+          <p:cNvPr id="22" name="Rectangle 21">
+            <a:extLst>
+              <a:ext uri="{FF2B5EF4-FFF2-40B4-BE49-F238E27FC236}">
+                <a16:creationId xmlns:a16="http://schemas.microsoft.com/office/drawing/2014/main" id="{100EDD19-6802-4EC3-95CE-CFFAB042CFD6}"/>
+              </a:ext>
+              <a:ext uri="{C183D7F6-B498-43B3-948B-1728B52AA6E4}">
+                <adec:decorative xmlns:adec="http://schemas.microsoft.com/office/drawing/2017/decorative" val="1"/>
+              </a:ext>
+            </a:extLst>
+          </p:cNvPr>
+          <p:cNvSpPr>
+            <a:spLocks noGrp="1" noRot="1" noChangeAspect="1" noMove="1" noResize="1" noEditPoints="1" noAdjustHandles="1" noChangeArrowheads="1" noChangeShapeType="1" noTextEdit="1"/>
+          </p:cNvSpPr>
+          <p:nvPr>
+            <p:extLst>
+              <p:ext uri="{386F3935-93C4-4BCD-93E2-E3B085C9AB24}">
+                <p16:designElem xmlns:p16="http://schemas.microsoft.com/office/powerpoint/2015/main" val="1"/>
+              </p:ext>
+            </p:extLst>
+          </p:nvPr>
+        </p:nvSpPr>
+        <p:spPr>
+          <a:xfrm>
+            <a:off x="0" y="0"/>
+            <a:ext cx="12188952" cy="6858000"/>
+          </a:xfrm>
+          <a:prstGeom prst="rect">
+            <a:avLst/>
+          </a:prstGeom>
+          <a:ln>
+            <a:noFill/>
+          </a:ln>
+        </p:spPr>
+        <p:style>
+          <a:lnRef idx="2">
+            <a:schemeClr val="accent1">
+              <a:shade val="50000"/>
+            </a:schemeClr>
+          </a:lnRef>
+          <a:fillRef idx="1">
+            <a:schemeClr val="accent1"/>
+          </a:fillRef>
+          <a:effectRef idx="0">
+            <a:schemeClr val="accent1"/>
+          </a:effectRef>
+          <a:fontRef idx="minor">
+            <a:schemeClr val="lt1"/>
+          </a:fontRef>
+        </p:style>
+        <p:txBody>
+          <a:bodyPr rtlCol="0" anchor="ctr"/>
+          <a:lstStyle/>
+          <a:p>
+            <a:pPr algn="ctr"/>
+            <a:endParaRPr lang="en-US"/>
+          </a:p>
+        </p:txBody>
+      </p:sp>
+      <p:sp>
+        <p:nvSpPr>
+          <p:cNvPr id="2" name="Title 1">
+            <a:extLst>
+              <a:ext uri="{FF2B5EF4-FFF2-40B4-BE49-F238E27FC236}">
+                <a16:creationId xmlns:a16="http://schemas.microsoft.com/office/drawing/2014/main" id="{7C6AFD45-E7B3-5F45-9F30-453710277085}"/>
+              </a:ext>
+            </a:extLst>
+          </p:cNvPr>
+          <p:cNvSpPr>
+            <a:spLocks noGrp="1"/>
+          </p:cNvSpPr>
+          <p:nvPr>
+            <p:ph type="title"/>
+          </p:nvPr>
+        </p:nvSpPr>
+        <p:spPr>
+          <a:xfrm>
+            <a:off x="838200" y="365125"/>
+            <a:ext cx="10515600" cy="1325563"/>
+          </a:xfrm>
+        </p:spPr>
+        <p:txBody>
+          <a:bodyPr>
+            <a:normAutofit/>
+          </a:bodyPr>
+          <a:lstStyle/>
+          <a:p>
+            <a:r>
+              <a:rPr lang="en-DE" sz="5400" dirty="0"/>
+              <a:t>What are Charts?</a:t>
+            </a:r>
+          </a:p>
+        </p:txBody>
+      </p:sp>
+      <p:sp>
+        <p:nvSpPr>
+          <p:cNvPr id="24" name="sketch line">
+            <a:extLst>
+              <a:ext uri="{FF2B5EF4-FFF2-40B4-BE49-F238E27FC236}">
+                <a16:creationId xmlns:a16="http://schemas.microsoft.com/office/drawing/2014/main" id="{DB17E863-922E-4C26-BD64-E8FD41D28661}"/>
+              </a:ext>
+              <a:ext uri="{C183D7F6-B498-43B3-948B-1728B52AA6E4}">
+                <adec:decorative xmlns:adec="http://schemas.microsoft.com/office/drawing/2017/decorative" val="1"/>
+              </a:ext>
+            </a:extLst>
+          </p:cNvPr>
+          <p:cNvSpPr>
+            <a:spLocks noGrp="1" noRot="1" noChangeAspect="1" noMove="1" noResize="1" noEditPoints="1" noAdjustHandles="1" noChangeArrowheads="1" noChangeShapeType="1" noTextEdit="1"/>
+          </p:cNvSpPr>
+          <p:nvPr>
+            <p:extLst>
+              <p:ext uri="{386F3935-93C4-4BCD-93E2-E3B085C9AB24}">
+                <p16:designElem xmlns:p16="http://schemas.microsoft.com/office/powerpoint/2015/main" val="1"/>
+              </p:ext>
+            </p:extLst>
+          </p:nvPr>
+        </p:nvSpPr>
+        <p:spPr>
+          <a:xfrm>
+            <a:off x="669036" y="1677373"/>
+            <a:ext cx="10853928" cy="18288"/>
+          </a:xfrm>
+          <a:custGeom>
+            <a:avLst/>
+            <a:gdLst>
+              <a:gd name="connsiteX0" fmla="*/ 0 w 10853928"/>
+              <a:gd name="connsiteY0" fmla="*/ 0 h 18288"/>
+              <a:gd name="connsiteX1" fmla="*/ 461292 w 10853928"/>
+              <a:gd name="connsiteY1" fmla="*/ 0 h 18288"/>
+              <a:gd name="connsiteX2" fmla="*/ 1139662 w 10853928"/>
+              <a:gd name="connsiteY2" fmla="*/ 0 h 18288"/>
+              <a:gd name="connsiteX3" fmla="*/ 1926572 w 10853928"/>
+              <a:gd name="connsiteY3" fmla="*/ 0 h 18288"/>
+              <a:gd name="connsiteX4" fmla="*/ 2279325 w 10853928"/>
+              <a:gd name="connsiteY4" fmla="*/ 0 h 18288"/>
+              <a:gd name="connsiteX5" fmla="*/ 2632078 w 10853928"/>
+              <a:gd name="connsiteY5" fmla="*/ 0 h 18288"/>
+              <a:gd name="connsiteX6" fmla="*/ 3527527 w 10853928"/>
+              <a:gd name="connsiteY6" fmla="*/ 0 h 18288"/>
+              <a:gd name="connsiteX7" fmla="*/ 4205897 w 10853928"/>
+              <a:gd name="connsiteY7" fmla="*/ 0 h 18288"/>
+              <a:gd name="connsiteX8" fmla="*/ 4558650 w 10853928"/>
+              <a:gd name="connsiteY8" fmla="*/ 0 h 18288"/>
+              <a:gd name="connsiteX9" fmla="*/ 5237020 w 10853928"/>
+              <a:gd name="connsiteY9" fmla="*/ 0 h 18288"/>
+              <a:gd name="connsiteX10" fmla="*/ 6132469 w 10853928"/>
+              <a:gd name="connsiteY10" fmla="*/ 0 h 18288"/>
+              <a:gd name="connsiteX11" fmla="*/ 6702301 w 10853928"/>
+              <a:gd name="connsiteY11" fmla="*/ 0 h 18288"/>
+              <a:gd name="connsiteX12" fmla="*/ 7272132 w 10853928"/>
+              <a:gd name="connsiteY12" fmla="*/ 0 h 18288"/>
+              <a:gd name="connsiteX13" fmla="*/ 7950502 w 10853928"/>
+              <a:gd name="connsiteY13" fmla="*/ 0 h 18288"/>
+              <a:gd name="connsiteX14" fmla="*/ 8737412 w 10853928"/>
+              <a:gd name="connsiteY14" fmla="*/ 0 h 18288"/>
+              <a:gd name="connsiteX15" fmla="*/ 9524322 w 10853928"/>
+              <a:gd name="connsiteY15" fmla="*/ 0 h 18288"/>
+              <a:gd name="connsiteX16" fmla="*/ 10853928 w 10853928"/>
+              <a:gd name="connsiteY16" fmla="*/ 0 h 18288"/>
+              <a:gd name="connsiteX17" fmla="*/ 10853928 w 10853928"/>
+              <a:gd name="connsiteY17" fmla="*/ 18288 h 18288"/>
+              <a:gd name="connsiteX18" fmla="*/ 10392636 w 10853928"/>
+              <a:gd name="connsiteY18" fmla="*/ 18288 h 18288"/>
+              <a:gd name="connsiteX19" fmla="*/ 9497187 w 10853928"/>
+              <a:gd name="connsiteY19" fmla="*/ 18288 h 18288"/>
+              <a:gd name="connsiteX20" fmla="*/ 8818817 w 10853928"/>
+              <a:gd name="connsiteY20" fmla="*/ 18288 h 18288"/>
+              <a:gd name="connsiteX21" fmla="*/ 8466064 w 10853928"/>
+              <a:gd name="connsiteY21" fmla="*/ 18288 h 18288"/>
+              <a:gd name="connsiteX22" fmla="*/ 7787693 w 10853928"/>
+              <a:gd name="connsiteY22" fmla="*/ 18288 h 18288"/>
+              <a:gd name="connsiteX23" fmla="*/ 7217862 w 10853928"/>
+              <a:gd name="connsiteY23" fmla="*/ 18288 h 18288"/>
+              <a:gd name="connsiteX24" fmla="*/ 6648031 w 10853928"/>
+              <a:gd name="connsiteY24" fmla="*/ 18288 h 18288"/>
+              <a:gd name="connsiteX25" fmla="*/ 6078200 w 10853928"/>
+              <a:gd name="connsiteY25" fmla="*/ 18288 h 18288"/>
+              <a:gd name="connsiteX26" fmla="*/ 5508368 w 10853928"/>
+              <a:gd name="connsiteY26" fmla="*/ 18288 h 18288"/>
+              <a:gd name="connsiteX27" fmla="*/ 4721459 w 10853928"/>
+              <a:gd name="connsiteY27" fmla="*/ 18288 h 18288"/>
+              <a:gd name="connsiteX28" fmla="*/ 4043088 w 10853928"/>
+              <a:gd name="connsiteY28" fmla="*/ 18288 h 18288"/>
+              <a:gd name="connsiteX29" fmla="*/ 3690336 w 10853928"/>
+              <a:gd name="connsiteY29" fmla="*/ 18288 h 18288"/>
+              <a:gd name="connsiteX30" fmla="*/ 3120504 w 10853928"/>
+              <a:gd name="connsiteY30" fmla="*/ 18288 h 18288"/>
+              <a:gd name="connsiteX31" fmla="*/ 2333595 w 10853928"/>
+              <a:gd name="connsiteY31" fmla="*/ 18288 h 18288"/>
+              <a:gd name="connsiteX32" fmla="*/ 1872303 w 10853928"/>
+              <a:gd name="connsiteY32" fmla="*/ 18288 h 18288"/>
+              <a:gd name="connsiteX33" fmla="*/ 976854 w 10853928"/>
+              <a:gd name="connsiteY33" fmla="*/ 18288 h 18288"/>
+              <a:gd name="connsiteX34" fmla="*/ 0 w 10853928"/>
+              <a:gd name="connsiteY34" fmla="*/ 18288 h 18288"/>
+              <a:gd name="connsiteX35" fmla="*/ 0 w 10853928"/>
+              <a:gd name="connsiteY35" fmla="*/ 0 h 18288"/>
+            </a:gdLst>
+            <a:ahLst/>
+            <a:cxnLst>
+              <a:cxn ang="0">
+                <a:pos x="connsiteX0" y="connsiteY0"/>
+              </a:cxn>
+              <a:cxn ang="0">
+                <a:pos x="connsiteX1" y="connsiteY1"/>
+              </a:cxn>
+              <a:cxn ang="0">
+                <a:pos x="connsiteX2" y="connsiteY2"/>
+              </a:cxn>
+              <a:cxn ang="0">
+                <a:pos x="connsiteX3" y="connsiteY3"/>
+              </a:cxn>
+              <a:cxn ang="0">
+                <a:pos x="connsiteX4" y="connsiteY4"/>
+              </a:cxn>
+              <a:cxn ang="0">
+                <a:pos x="connsiteX5" y="connsiteY5"/>
+              </a:cxn>
+              <a:cxn ang="0">
+                <a:pos x="connsiteX6" y="connsiteY6"/>
+              </a:cxn>
+              <a:cxn ang="0">
+                <a:pos x="connsiteX7" y="connsiteY7"/>
+              </a:cxn>
+              <a:cxn ang="0">
+                <a:pos x="connsiteX8" y="connsiteY8"/>
+              </a:cxn>
+              <a:cxn ang="0">
+                <a:pos x="connsiteX9" y="connsiteY9"/>
+              </a:cxn>
+              <a:cxn ang="0">
+                <a:pos x="connsiteX10" y="connsiteY10"/>
+              </a:cxn>
+              <a:cxn ang="0">
+                <a:pos x="connsiteX11" y="connsiteY11"/>
+              </a:cxn>
+              <a:cxn ang="0">
+                <a:pos x="connsiteX12" y="connsiteY12"/>
+              </a:cxn>
+              <a:cxn ang="0">
+                <a:pos x="connsiteX13" y="connsiteY13"/>
+              </a:cxn>
+              <a:cxn ang="0">
+                <a:pos x="connsiteX14" y="connsiteY14"/>
+              </a:cxn>
+              <a:cxn ang="0">
+                <a:pos x="connsiteX15" y="connsiteY15"/>
+              </a:cxn>
+              <a:cxn ang="0">
+                <a:pos x="connsiteX16" y="connsiteY16"/>
+              </a:cxn>
+              <a:cxn ang="0">
+                <a:pos x="connsiteX17" y="connsiteY17"/>
+              </a:cxn>
+              <a:cxn ang="0">
+                <a:pos x="connsiteX18" y="connsiteY18"/>
+              </a:cxn>
+              <a:cxn ang="0">
+                <a:pos x="connsiteX19" y="connsiteY19"/>
+              </a:cxn>
+              <a:cxn ang="0">
+                <a:pos x="connsiteX20" y="connsiteY20"/>
+              </a:cxn>
+              <a:cxn ang="0">
+                <a:pos x="connsiteX21" y="connsiteY21"/>
+              </a:cxn>
+              <a:cxn ang="0">
+                <a:pos x="connsiteX22" y="connsiteY22"/>
+              </a:cxn>
+              <a:cxn ang="0">
+                <a:pos x="connsiteX23" y="connsiteY23"/>
+              </a:cxn>
+              <a:cxn ang="0">
+                <a:pos x="connsiteX24" y="connsiteY24"/>
+              </a:cxn>
+              <a:cxn ang="0">
+                <a:pos x="connsiteX25" y="connsiteY25"/>
+              </a:cxn>
+              <a:cxn ang="0">
+                <a:pos x="connsiteX26" y="connsiteY26"/>
+              </a:cxn>
+              <a:cxn ang="0">
+                <a:pos x="connsiteX27" y="connsiteY27"/>
+              </a:cxn>
+              <a:cxn ang="0">
+                <a:pos x="connsiteX28" y="connsiteY28"/>
+              </a:cxn>
+              <a:cxn ang="0">
+                <a:pos x="connsiteX29" y="connsiteY29"/>
+              </a:cxn>
+              <a:cxn ang="0">
+                <a:pos x="connsiteX30" y="connsiteY30"/>
+              </a:cxn>
+              <a:cxn ang="0">
+                <a:pos x="connsiteX31" y="connsiteY31"/>
+              </a:cxn>
+              <a:cxn ang="0">
+                <a:pos x="connsiteX32" y="connsiteY32"/>
+              </a:cxn>
+              <a:cxn ang="0">
+                <a:pos x="connsiteX33" y="connsiteY33"/>
+              </a:cxn>
+              <a:cxn ang="0">
+                <a:pos x="connsiteX34" y="connsiteY34"/>
+              </a:cxn>
+              <a:cxn ang="0">
+                <a:pos x="connsiteX35" y="connsiteY35"/>
+              </a:cxn>
+            </a:cxnLst>
+            <a:rect l="l" t="t" r="r" b="b"/>
+            <a:pathLst>
+              <a:path w="10853928" h="18288" fill="none" extrusionOk="0">
+                <a:moveTo>
+                  <a:pt x="0" y="0"/>
+                </a:moveTo>
+                <a:cubicBezTo>
+                  <a:pt x="146993" y="-19076"/>
+                  <a:pt x="347684" y="-4790"/>
+                  <a:pt x="461292" y="0"/>
+                </a:cubicBezTo>
+                <a:cubicBezTo>
+                  <a:pt x="574900" y="4790"/>
+                  <a:pt x="808367" y="19821"/>
+                  <a:pt x="1139662" y="0"/>
+                </a:cubicBezTo>
+                <a:cubicBezTo>
+                  <a:pt x="1470957" y="-19821"/>
+                  <a:pt x="1627405" y="5721"/>
+                  <a:pt x="1926572" y="0"/>
+                </a:cubicBezTo>
+                <a:cubicBezTo>
+                  <a:pt x="2225739" y="-5721"/>
+                  <a:pt x="2137730" y="-3235"/>
+                  <a:pt x="2279325" y="0"/>
+                </a:cubicBezTo>
+                <a:cubicBezTo>
+                  <a:pt x="2420920" y="3235"/>
+                  <a:pt x="2456518" y="9685"/>
+                  <a:pt x="2632078" y="0"/>
+                </a:cubicBezTo>
+                <a:cubicBezTo>
+                  <a:pt x="2807638" y="-9685"/>
+                  <a:pt x="3211516" y="-43007"/>
+                  <a:pt x="3527527" y="0"/>
+                </a:cubicBezTo>
+                <a:cubicBezTo>
+                  <a:pt x="3843538" y="43007"/>
+                  <a:pt x="4058833" y="22042"/>
+                  <a:pt x="4205897" y="0"/>
+                </a:cubicBezTo>
+                <a:cubicBezTo>
+                  <a:pt x="4352961" y="-22042"/>
+                  <a:pt x="4474805" y="-11846"/>
+                  <a:pt x="4558650" y="0"/>
+                </a:cubicBezTo>
+                <a:cubicBezTo>
+                  <a:pt x="4642495" y="11846"/>
+                  <a:pt x="5041928" y="-6069"/>
+                  <a:pt x="5237020" y="0"/>
+                </a:cubicBezTo>
+                <a:cubicBezTo>
+                  <a:pt x="5432112" y="6069"/>
+                  <a:pt x="5943266" y="-17479"/>
+                  <a:pt x="6132469" y="0"/>
+                </a:cubicBezTo>
+                <a:cubicBezTo>
+                  <a:pt x="6321672" y="17479"/>
+                  <a:pt x="6483872" y="26234"/>
+                  <a:pt x="6702301" y="0"/>
+                </a:cubicBezTo>
+                <a:cubicBezTo>
+                  <a:pt x="6920730" y="-26234"/>
+                  <a:pt x="6991194" y="-15156"/>
+                  <a:pt x="7272132" y="0"/>
+                </a:cubicBezTo>
+                <a:cubicBezTo>
+                  <a:pt x="7553070" y="15156"/>
+                  <a:pt x="7684444" y="-32961"/>
+                  <a:pt x="7950502" y="0"/>
+                </a:cubicBezTo>
+                <a:cubicBezTo>
+                  <a:pt x="8216560" y="32961"/>
+                  <a:pt x="8493290" y="-10491"/>
+                  <a:pt x="8737412" y="0"/>
+                </a:cubicBezTo>
+                <a:cubicBezTo>
+                  <a:pt x="8981534" y="10491"/>
+                  <a:pt x="9191586" y="-13899"/>
+                  <a:pt x="9524322" y="0"/>
+                </a:cubicBezTo>
+                <a:cubicBezTo>
+                  <a:pt x="9857058" y="13899"/>
+                  <a:pt x="10297509" y="7485"/>
+                  <a:pt x="10853928" y="0"/>
+                </a:cubicBezTo>
+                <a:cubicBezTo>
+                  <a:pt x="10854574" y="4451"/>
+                  <a:pt x="10854418" y="9226"/>
+                  <a:pt x="10853928" y="18288"/>
+                </a:cubicBezTo>
+                <a:cubicBezTo>
+                  <a:pt x="10691638" y="28522"/>
+                  <a:pt x="10574319" y="29578"/>
+                  <a:pt x="10392636" y="18288"/>
+                </a:cubicBezTo>
+                <a:cubicBezTo>
+                  <a:pt x="10210953" y="6998"/>
+                  <a:pt x="9836277" y="-16742"/>
+                  <a:pt x="9497187" y="18288"/>
+                </a:cubicBezTo>
+                <a:cubicBezTo>
+                  <a:pt x="9158097" y="53318"/>
+                  <a:pt x="9119479" y="30714"/>
+                  <a:pt x="8818817" y="18288"/>
+                </a:cubicBezTo>
+                <a:cubicBezTo>
+                  <a:pt x="8518155" y="5863"/>
+                  <a:pt x="8640037" y="6483"/>
+                  <a:pt x="8466064" y="18288"/>
+                </a:cubicBezTo>
+                <a:cubicBezTo>
+                  <a:pt x="8292091" y="30093"/>
+                  <a:pt x="7997656" y="18914"/>
+                  <a:pt x="7787693" y="18288"/>
+                </a:cubicBezTo>
+                <a:cubicBezTo>
+                  <a:pt x="7577730" y="17662"/>
+                  <a:pt x="7412468" y="21416"/>
+                  <a:pt x="7217862" y="18288"/>
+                </a:cubicBezTo>
+                <a:cubicBezTo>
+                  <a:pt x="7023256" y="15160"/>
+                  <a:pt x="6898018" y="14824"/>
+                  <a:pt x="6648031" y="18288"/>
+                </a:cubicBezTo>
+                <a:cubicBezTo>
+                  <a:pt x="6398044" y="21752"/>
+                  <a:pt x="6254402" y="38625"/>
+                  <a:pt x="6078200" y="18288"/>
+                </a:cubicBezTo>
+                <a:cubicBezTo>
+                  <a:pt x="5901998" y="-2049"/>
+                  <a:pt x="5622886" y="3213"/>
+                  <a:pt x="5508368" y="18288"/>
+                </a:cubicBezTo>
+                <a:cubicBezTo>
+                  <a:pt x="5393850" y="33363"/>
+                  <a:pt x="5036260" y="26830"/>
+                  <a:pt x="4721459" y="18288"/>
+                </a:cubicBezTo>
+                <a:cubicBezTo>
+                  <a:pt x="4406658" y="9746"/>
+                  <a:pt x="4239221" y="41551"/>
+                  <a:pt x="4043088" y="18288"/>
+                </a:cubicBezTo>
+                <a:cubicBezTo>
+                  <a:pt x="3846955" y="-4975"/>
+                  <a:pt x="3818802" y="34658"/>
+                  <a:pt x="3690336" y="18288"/>
+                </a:cubicBezTo>
+                <a:cubicBezTo>
+                  <a:pt x="3561870" y="1918"/>
+                  <a:pt x="3265491" y="42194"/>
+                  <a:pt x="3120504" y="18288"/>
+                </a:cubicBezTo>
+                <a:cubicBezTo>
+                  <a:pt x="2975517" y="-5618"/>
+                  <a:pt x="2720254" y="36673"/>
+                  <a:pt x="2333595" y="18288"/>
+                </a:cubicBezTo>
+                <a:cubicBezTo>
+                  <a:pt x="1946936" y="-97"/>
+                  <a:pt x="2097241" y="5776"/>
+                  <a:pt x="1872303" y="18288"/>
+                </a:cubicBezTo>
+                <a:cubicBezTo>
+                  <a:pt x="1647365" y="30800"/>
+                  <a:pt x="1282708" y="45380"/>
+                  <a:pt x="976854" y="18288"/>
+                </a:cubicBezTo>
+                <a:cubicBezTo>
+                  <a:pt x="671000" y="-8804"/>
+                  <a:pt x="408401" y="-12775"/>
+                  <a:pt x="0" y="18288"/>
+                </a:cubicBezTo>
+                <a:cubicBezTo>
+                  <a:pt x="-213" y="9468"/>
+                  <a:pt x="187" y="4459"/>
+                  <a:pt x="0" y="0"/>
+                </a:cubicBezTo>
+                <a:close/>
+              </a:path>
+              <a:path w="10853928" h="18288" stroke="0" extrusionOk="0">
+                <a:moveTo>
+                  <a:pt x="0" y="0"/>
+                </a:moveTo>
+                <a:cubicBezTo>
+                  <a:pt x="267322" y="15284"/>
+                  <a:pt x="415388" y="-21048"/>
+                  <a:pt x="569831" y="0"/>
+                </a:cubicBezTo>
+                <a:cubicBezTo>
+                  <a:pt x="724274" y="21048"/>
+                  <a:pt x="769333" y="-2353"/>
+                  <a:pt x="922584" y="0"/>
+                </a:cubicBezTo>
+                <a:cubicBezTo>
+                  <a:pt x="1075835" y="2353"/>
+                  <a:pt x="1399490" y="-145"/>
+                  <a:pt x="1818033" y="0"/>
+                </a:cubicBezTo>
+                <a:cubicBezTo>
+                  <a:pt x="2236576" y="145"/>
+                  <a:pt x="2145330" y="5482"/>
+                  <a:pt x="2387864" y="0"/>
+                </a:cubicBezTo>
+                <a:cubicBezTo>
+                  <a:pt x="2630398" y="-5482"/>
+                  <a:pt x="2793207" y="18487"/>
+                  <a:pt x="2957695" y="0"/>
+                </a:cubicBezTo>
+                <a:cubicBezTo>
+                  <a:pt x="3122183" y="-18487"/>
+                  <a:pt x="3579141" y="19003"/>
+                  <a:pt x="3853144" y="0"/>
+                </a:cubicBezTo>
+                <a:cubicBezTo>
+                  <a:pt x="4127147" y="-19003"/>
+                  <a:pt x="4209857" y="12211"/>
+                  <a:pt x="4314436" y="0"/>
+                </a:cubicBezTo>
+                <a:cubicBezTo>
+                  <a:pt x="4419015" y="-12211"/>
+                  <a:pt x="4762459" y="-17220"/>
+                  <a:pt x="5209885" y="0"/>
+                </a:cubicBezTo>
+                <a:cubicBezTo>
+                  <a:pt x="5657311" y="17220"/>
+                  <a:pt x="5692663" y="-3290"/>
+                  <a:pt x="6105335" y="0"/>
+                </a:cubicBezTo>
+                <a:cubicBezTo>
+                  <a:pt x="6518007" y="3290"/>
+                  <a:pt x="6455516" y="-5124"/>
+                  <a:pt x="6783705" y="0"/>
+                </a:cubicBezTo>
+                <a:cubicBezTo>
+                  <a:pt x="7111894" y="5124"/>
+                  <a:pt x="7441941" y="-17829"/>
+                  <a:pt x="7679154" y="0"/>
+                </a:cubicBezTo>
+                <a:cubicBezTo>
+                  <a:pt x="7916367" y="17829"/>
+                  <a:pt x="8102967" y="-24363"/>
+                  <a:pt x="8248985" y="0"/>
+                </a:cubicBezTo>
+                <a:cubicBezTo>
+                  <a:pt x="8395003" y="24363"/>
+                  <a:pt x="8552393" y="25505"/>
+                  <a:pt x="8818817" y="0"/>
+                </a:cubicBezTo>
+                <a:cubicBezTo>
+                  <a:pt x="9085241" y="-25505"/>
+                  <a:pt x="9411308" y="38000"/>
+                  <a:pt x="9605726" y="0"/>
+                </a:cubicBezTo>
+                <a:cubicBezTo>
+                  <a:pt x="9800144" y="-38000"/>
+                  <a:pt x="10006468" y="-25741"/>
+                  <a:pt x="10175558" y="0"/>
+                </a:cubicBezTo>
+                <a:cubicBezTo>
+                  <a:pt x="10344648" y="25741"/>
+                  <a:pt x="10696282" y="695"/>
+                  <a:pt x="10853928" y="0"/>
+                </a:cubicBezTo>
+                <a:cubicBezTo>
+                  <a:pt x="10853521" y="8690"/>
+                  <a:pt x="10853774" y="14141"/>
+                  <a:pt x="10853928" y="18288"/>
+                </a:cubicBezTo>
+                <a:cubicBezTo>
+                  <a:pt x="10608124" y="24255"/>
+                  <a:pt x="10343415" y="22307"/>
+                  <a:pt x="10067018" y="18288"/>
+                </a:cubicBezTo>
+                <a:cubicBezTo>
+                  <a:pt x="9790621" y="14270"/>
+                  <a:pt x="9843266" y="3564"/>
+                  <a:pt x="9714266" y="18288"/>
+                </a:cubicBezTo>
+                <a:cubicBezTo>
+                  <a:pt x="9585266" y="33012"/>
+                  <a:pt x="9379484" y="1875"/>
+                  <a:pt x="9252974" y="18288"/>
+                </a:cubicBezTo>
+                <a:cubicBezTo>
+                  <a:pt x="9126464" y="34701"/>
+                  <a:pt x="8580678" y="-4904"/>
+                  <a:pt x="8357525" y="18288"/>
+                </a:cubicBezTo>
+                <a:cubicBezTo>
+                  <a:pt x="8134372" y="41480"/>
+                  <a:pt x="7903199" y="26458"/>
+                  <a:pt x="7679154" y="18288"/>
+                </a:cubicBezTo>
+                <a:cubicBezTo>
+                  <a:pt x="7455109" y="10118"/>
+                  <a:pt x="7435944" y="27109"/>
+                  <a:pt x="7217862" y="18288"/>
+                </a:cubicBezTo>
+                <a:cubicBezTo>
+                  <a:pt x="6999780" y="9467"/>
+                  <a:pt x="6680409" y="18985"/>
+                  <a:pt x="6539492" y="18288"/>
+                </a:cubicBezTo>
+                <a:cubicBezTo>
+                  <a:pt x="6398575" y="17592"/>
+                  <a:pt x="6312077" y="33018"/>
+                  <a:pt x="6186739" y="18288"/>
+                </a:cubicBezTo>
+                <a:cubicBezTo>
+                  <a:pt x="6061401" y="3558"/>
+                  <a:pt x="5947033" y="12075"/>
+                  <a:pt x="5833986" y="18288"/>
+                </a:cubicBezTo>
+                <a:cubicBezTo>
+                  <a:pt x="5720939" y="24501"/>
+                  <a:pt x="5482226" y="8586"/>
+                  <a:pt x="5155616" y="18288"/>
+                </a:cubicBezTo>
+                <a:cubicBezTo>
+                  <a:pt x="4829006" y="27991"/>
+                  <a:pt x="4841274" y="29316"/>
+                  <a:pt x="4694324" y="18288"/>
+                </a:cubicBezTo>
+                <a:cubicBezTo>
+                  <a:pt x="4547374" y="7260"/>
+                  <a:pt x="4077675" y="7013"/>
+                  <a:pt x="3907414" y="18288"/>
+                </a:cubicBezTo>
+                <a:cubicBezTo>
+                  <a:pt x="3737153" y="29564"/>
+                  <a:pt x="3538393" y="21630"/>
+                  <a:pt x="3446122" y="18288"/>
+                </a:cubicBezTo>
+                <a:cubicBezTo>
+                  <a:pt x="3353851" y="14946"/>
+                  <a:pt x="2990320" y="-8091"/>
+                  <a:pt x="2659212" y="18288"/>
+                </a:cubicBezTo>
+                <a:cubicBezTo>
+                  <a:pt x="2328104" y="44667"/>
+                  <a:pt x="2427653" y="9607"/>
+                  <a:pt x="2306460" y="18288"/>
+                </a:cubicBezTo>
+                <a:cubicBezTo>
+                  <a:pt x="2185267" y="26969"/>
+                  <a:pt x="1719763" y="3717"/>
+                  <a:pt x="1519550" y="18288"/>
+                </a:cubicBezTo>
+                <a:cubicBezTo>
+                  <a:pt x="1319337" y="32860"/>
+                  <a:pt x="1167371" y="17040"/>
+                  <a:pt x="1058258" y="18288"/>
+                </a:cubicBezTo>
+                <a:cubicBezTo>
+                  <a:pt x="949145" y="19536"/>
+                  <a:pt x="780234" y="31447"/>
+                  <a:pt x="705505" y="18288"/>
+                </a:cubicBezTo>
+                <a:cubicBezTo>
+                  <a:pt x="630776" y="5129"/>
+                  <a:pt x="215796" y="30056"/>
+                  <a:pt x="0" y="18288"/>
+                </a:cubicBezTo>
+                <a:cubicBezTo>
+                  <a:pt x="-53" y="11301"/>
+                  <a:pt x="-649" y="7756"/>
+                  <a:pt x="0" y="0"/>
+                </a:cubicBezTo>
+                <a:close/>
+              </a:path>
+            </a:pathLst>
+          </a:custGeom>
+          <a:solidFill>
+            <a:schemeClr val="accent2"/>
+          </a:solidFill>
+          <a:ln w="41275" cap="rnd">
+            <a:solidFill>
+              <a:schemeClr val="accent2"/>
+            </a:solidFill>
+            <a:round/>
+            <a:extLst>
+              <a:ext uri="{C807C97D-BFC1-408E-A445-0C87EB9F89A2}">
+                <ask:lineSketchStyleProps xmlns:ask="http://schemas.microsoft.com/office/drawing/2018/sketchyshapes" sd="1219033472">
+                  <a:prstGeom prst="rect">
+                    <a:avLst/>
+                  </a:prstGeom>
+                  <ask:type>
+                    <ask:lineSketchFreehand/>
+                  </ask:type>
+                </ask:lineSketchStyleProps>
+              </a:ext>
+            </a:extLst>
+          </a:ln>
+        </p:spPr>
+        <p:style>
+          <a:lnRef idx="2">
+            <a:schemeClr val="accent1">
+              <a:shade val="50000"/>
+            </a:schemeClr>
+          </a:lnRef>
+          <a:fillRef idx="1">
+            <a:schemeClr val="accent1"/>
+          </a:fillRef>
+          <a:effectRef idx="0">
+            <a:schemeClr val="accent1"/>
+          </a:effectRef>
+          <a:fontRef idx="minor">
+            <a:schemeClr val="lt1"/>
+          </a:fontRef>
+        </p:style>
+        <p:txBody>
+          <a:bodyPr rtlCol="0" anchor="ctr"/>
+          <a:lstStyle/>
+          <a:p>
+            <a:pPr algn="ctr"/>
+            <a:endParaRPr lang="en-US"/>
+          </a:p>
+        </p:txBody>
+      </p:sp>
+      <p:sp>
+        <p:nvSpPr>
+          <p:cNvPr id="3" name="Content Placeholder 2">
+            <a:extLst>
+              <a:ext uri="{FF2B5EF4-FFF2-40B4-BE49-F238E27FC236}">
+                <a16:creationId xmlns:a16="http://schemas.microsoft.com/office/drawing/2014/main" id="{D2963DD4-BD7B-804A-B6C3-F31858A29F7E}"/>
+              </a:ext>
+            </a:extLst>
+          </p:cNvPr>
+          <p:cNvSpPr>
+            <a:spLocks noGrp="1"/>
+          </p:cNvSpPr>
+          <p:nvPr>
+            <p:ph idx="1"/>
+          </p:nvPr>
+        </p:nvSpPr>
+        <p:spPr>
+          <a:xfrm>
+            <a:off x="838200" y="1929384"/>
+            <a:ext cx="10515600" cy="4251960"/>
+          </a:xfrm>
+        </p:spPr>
+        <p:txBody>
+          <a:bodyPr>
+            <a:normAutofit/>
+          </a:bodyPr>
+          <a:lstStyle/>
+          <a:p>
+            <a:r>
+              <a:rPr lang="en-DE" sz="2200" dirty="0">
+                <a:latin typeface="+mj-lt"/>
+              </a:rPr>
+              <a:t>cgdfg</a:t>
+            </a:r>
+          </a:p>
+        </p:txBody>
+      </p:sp>
+      <p:sp>
+        <p:nvSpPr>
+          <p:cNvPr id="4" name="Footer Placeholder 3">
+            <a:extLst>
+              <a:ext uri="{FF2B5EF4-FFF2-40B4-BE49-F238E27FC236}">
+                <a16:creationId xmlns:a16="http://schemas.microsoft.com/office/drawing/2014/main" id="{F8993BB5-426F-FC49-9AE2-EA5D1AFB000D}"/>
+              </a:ext>
+            </a:extLst>
+          </p:cNvPr>
+          <p:cNvSpPr>
+            <a:spLocks noGrp="1"/>
+          </p:cNvSpPr>
+          <p:nvPr>
+            <p:ph type="ftr" sz="quarter" idx="11"/>
+          </p:nvPr>
+        </p:nvSpPr>
+        <p:spPr>
+          <a:xfrm>
+            <a:off x="4038600" y="6356350"/>
+            <a:ext cx="4114800" cy="365125"/>
+          </a:xfrm>
+        </p:spPr>
+        <p:txBody>
+          <a:bodyPr>
+            <a:normAutofit/>
+          </a:bodyPr>
+          <a:lstStyle/>
+          <a:p>
+            <a:pPr>
+              <a:spcAft>
+                <a:spcPts val="600"/>
+              </a:spcAft>
+            </a:pPr>
+            <a:r>
+              <a:rPr lang="en-GB"/>
+              <a:t>© 2021 Stefan Kürzeder</a:t>
+            </a:r>
+            <a:endParaRPr lang="en-DE"/>
+          </a:p>
+        </p:txBody>
+      </p:sp>
+    </p:spTree>
+    <p:extLst>
+      <p:ext uri="{BB962C8B-B14F-4D97-AF65-F5344CB8AC3E}">
+        <p14:creationId xmlns:p14="http://schemas.microsoft.com/office/powerpoint/2010/main" val="2407938299"/>
+      </p:ext>
+    </p:extLst>
+  </p:cSld>
+  <p:clrMapOvr>
+    <a:masterClrMapping/>
+  </p:clrMapOvr>
+</p:sld>
+</file>
+
+<file path=ppt/slides/slide6.xml><?xml version="1.0" encoding="utf-8"?>
+<p:sld xmlns:a="http://schemas.openxmlformats.org/drawingml/2006/main" xmlns:r="http://schemas.openxmlformats.org/officeDocument/2006/relationships" xmlns:p="http://schemas.openxmlformats.org/presentationml/2006/main">
+  <p:cSld>
+    <p:bg>
+      <p:bgPr>
+        <a:solidFill>
+          <a:schemeClr val="bg1"/>
+        </a:solidFill>
+        <a:effectLst/>
+      </p:bgPr>
+    </p:bg>
+    <p:spTree>
+      <p:nvGrpSpPr>
+        <p:cNvPr id="1" name=""/>
+        <p:cNvGrpSpPr/>
+        <p:nvPr/>
+      </p:nvGrpSpPr>
+      <p:grpSpPr>
+        <a:xfrm>
+          <a:off x="0" y="0"/>
+          <a:ext cx="0" cy="0"/>
+          <a:chOff x="0" y="0"/>
+          <a:chExt cx="0" cy="0"/>
+        </a:xfrm>
+      </p:grpSpPr>
+      <p:sp useBgFill="1">
+        <p:nvSpPr>
+          <p:cNvPr id="256" name="Rectangle 123">
+            <a:extLst>
+              <a:ext uri="{FF2B5EF4-FFF2-40B4-BE49-F238E27FC236}">
+                <a16:creationId xmlns:a16="http://schemas.microsoft.com/office/drawing/2014/main" id="{943CAA20-3569-4189-9E48-239A229A86CA}"/>
+              </a:ext>
+              <a:ext uri="{C183D7F6-B498-43B3-948B-1728B52AA6E4}">
+                <adec:decorative xmlns:adec="http://schemas.microsoft.com/office/drawing/2017/decorative" val="1"/>
+              </a:ext>
+            </a:extLst>
+          </p:cNvPr>
+          <p:cNvSpPr>
+            <a:spLocks noGrp="1" noRot="1" noChangeAspect="1" noMove="1" noResize="1" noEditPoints="1" noAdjustHandles="1" noChangeArrowheads="1" noChangeShapeType="1" noTextEdit="1"/>
+          </p:cNvSpPr>
+          <p:nvPr>
+            <p:extLst>
+              <p:ext uri="{386F3935-93C4-4BCD-93E2-E3B085C9AB24}">
+                <p16:designElem xmlns:p16="http://schemas.microsoft.com/office/powerpoint/2015/main" val="1"/>
+              </p:ext>
+            </p:extLst>
+          </p:nvPr>
+        </p:nvSpPr>
+        <p:spPr>
+          <a:xfrm>
+            <a:off x="0" y="0"/>
+            <a:ext cx="12188952" cy="6858000"/>
+          </a:xfrm>
+          <a:prstGeom prst="rect">
+            <a:avLst/>
+          </a:prstGeom>
+          <a:ln>
+            <a:noFill/>
+          </a:ln>
+        </p:spPr>
+        <p:style>
+          <a:lnRef idx="2">
+            <a:schemeClr val="accent1">
+              <a:shade val="50000"/>
+            </a:schemeClr>
+          </a:lnRef>
+          <a:fillRef idx="1">
+            <a:schemeClr val="accent1"/>
+          </a:fillRef>
+          <a:effectRef idx="0">
+            <a:schemeClr val="accent1"/>
+          </a:effectRef>
+          <a:fontRef idx="minor">
+            <a:schemeClr val="lt1"/>
+          </a:fontRef>
+        </p:style>
+        <p:txBody>
+          <a:bodyPr rtlCol="0" anchor="ctr"/>
+          <a:lstStyle/>
+          <a:p>
+            <a:pPr algn="ctr"/>
+            <a:endParaRPr lang="en-US"/>
+          </a:p>
+        </p:txBody>
+      </p:sp>
+      <p:sp>
+        <p:nvSpPr>
+          <p:cNvPr id="2" name="Title 1">
+            <a:extLst>
+              <a:ext uri="{FF2B5EF4-FFF2-40B4-BE49-F238E27FC236}">
+                <a16:creationId xmlns:a16="http://schemas.microsoft.com/office/drawing/2014/main" id="{7C6AFD45-E7B3-5F45-9F30-453710277085}"/>
+              </a:ext>
+            </a:extLst>
+          </p:cNvPr>
+          <p:cNvSpPr>
+            <a:spLocks noGrp="1"/>
+          </p:cNvSpPr>
+          <p:nvPr>
+            <p:ph type="title"/>
+          </p:nvPr>
+        </p:nvSpPr>
+        <p:spPr>
+          <a:xfrm>
+            <a:off x="838200" y="451381"/>
+            <a:ext cx="10512552" cy="4066540"/>
+          </a:xfrm>
+        </p:spPr>
+        <p:txBody>
+          <a:bodyPr vert="horz" lIns="91440" tIns="45720" rIns="91440" bIns="45720" rtlCol="0" anchor="b">
+            <a:normAutofit/>
+          </a:bodyPr>
+          <a:lstStyle/>
+          <a:p>
+            <a:r>
+              <a:rPr lang="en-US" sz="6600" kern="1200" dirty="0">
+                <a:solidFill>
+                  <a:schemeClr val="tx1"/>
+                </a:solidFill>
+                <a:latin typeface="+mj-lt"/>
+                <a:ea typeface="+mj-ea"/>
+                <a:cs typeface="+mj-cs"/>
+              </a:rPr>
+              <a:t>Demo Time!</a:t>
+            </a:r>
+          </a:p>
+        </p:txBody>
+      </p:sp>
+      <p:sp>
+        <p:nvSpPr>
+          <p:cNvPr id="257" name="sketch line">
+            <a:extLst>
+              <a:ext uri="{FF2B5EF4-FFF2-40B4-BE49-F238E27FC236}">
+                <a16:creationId xmlns:a16="http://schemas.microsoft.com/office/drawing/2014/main" id="{DA542B6D-E775-4832-91DC-2D20F857813A}"/>
+              </a:ext>
+              <a:ext uri="{C183D7F6-B498-43B3-948B-1728B52AA6E4}">
+                <adec:decorative xmlns:adec="http://schemas.microsoft.com/office/drawing/2017/decorative" val="1"/>
+              </a:ext>
+            </a:extLst>
+          </p:cNvPr>
+          <p:cNvSpPr>
+            <a:spLocks noGrp="1" noRot="1" noChangeAspect="1" noMove="1" noResize="1" noEditPoints="1" noAdjustHandles="1" noChangeArrowheads="1" noChangeShapeType="1" noTextEdit="1"/>
+          </p:cNvSpPr>
+          <p:nvPr>
+            <p:extLst>
+              <p:ext uri="{386F3935-93C4-4BCD-93E2-E3B085C9AB24}">
+                <p16:designElem xmlns:p16="http://schemas.microsoft.com/office/powerpoint/2015/main" val="1"/>
+              </p:ext>
+            </p:extLst>
+          </p:nvPr>
+        </p:nvSpPr>
+        <p:spPr>
+          <a:xfrm>
+            <a:off x="838200" y="4718595"/>
+            <a:ext cx="5410200" cy="18288"/>
+          </a:xfrm>
+          <a:custGeom>
+            <a:avLst/>
+            <a:gdLst>
+              <a:gd name="connsiteX0" fmla="*/ 0 w 5410200"/>
+              <a:gd name="connsiteY0" fmla="*/ 0 h 18288"/>
+              <a:gd name="connsiteX1" fmla="*/ 568071 w 5410200"/>
+              <a:gd name="connsiteY1" fmla="*/ 0 h 18288"/>
+              <a:gd name="connsiteX2" fmla="*/ 1298448 w 5410200"/>
+              <a:gd name="connsiteY2" fmla="*/ 0 h 18288"/>
+              <a:gd name="connsiteX3" fmla="*/ 1920621 w 5410200"/>
+              <a:gd name="connsiteY3" fmla="*/ 0 h 18288"/>
+              <a:gd name="connsiteX4" fmla="*/ 2488692 w 5410200"/>
+              <a:gd name="connsiteY4" fmla="*/ 0 h 18288"/>
+              <a:gd name="connsiteX5" fmla="*/ 3219069 w 5410200"/>
+              <a:gd name="connsiteY5" fmla="*/ 0 h 18288"/>
+              <a:gd name="connsiteX6" fmla="*/ 3895344 w 5410200"/>
+              <a:gd name="connsiteY6" fmla="*/ 0 h 18288"/>
+              <a:gd name="connsiteX7" fmla="*/ 4571619 w 5410200"/>
+              <a:gd name="connsiteY7" fmla="*/ 0 h 18288"/>
+              <a:gd name="connsiteX8" fmla="*/ 5410200 w 5410200"/>
+              <a:gd name="connsiteY8" fmla="*/ 0 h 18288"/>
+              <a:gd name="connsiteX9" fmla="*/ 5410200 w 5410200"/>
+              <a:gd name="connsiteY9" fmla="*/ 18288 h 18288"/>
+              <a:gd name="connsiteX10" fmla="*/ 4842129 w 5410200"/>
+              <a:gd name="connsiteY10" fmla="*/ 18288 h 18288"/>
+              <a:gd name="connsiteX11" fmla="*/ 4328160 w 5410200"/>
+              <a:gd name="connsiteY11" fmla="*/ 18288 h 18288"/>
+              <a:gd name="connsiteX12" fmla="*/ 3597783 w 5410200"/>
+              <a:gd name="connsiteY12" fmla="*/ 18288 h 18288"/>
+              <a:gd name="connsiteX13" fmla="*/ 3029712 w 5410200"/>
+              <a:gd name="connsiteY13" fmla="*/ 18288 h 18288"/>
+              <a:gd name="connsiteX14" fmla="*/ 2299335 w 5410200"/>
+              <a:gd name="connsiteY14" fmla="*/ 18288 h 18288"/>
+              <a:gd name="connsiteX15" fmla="*/ 1514856 w 5410200"/>
+              <a:gd name="connsiteY15" fmla="*/ 18288 h 18288"/>
+              <a:gd name="connsiteX16" fmla="*/ 892683 w 5410200"/>
+              <a:gd name="connsiteY16" fmla="*/ 18288 h 18288"/>
+              <a:gd name="connsiteX17" fmla="*/ 0 w 5410200"/>
+              <a:gd name="connsiteY17" fmla="*/ 18288 h 18288"/>
+              <a:gd name="connsiteX18" fmla="*/ 0 w 5410200"/>
+              <a:gd name="connsiteY18" fmla="*/ 0 h 18288"/>
+            </a:gdLst>
+            <a:ahLst/>
+            <a:cxnLst>
+              <a:cxn ang="0">
+                <a:pos x="connsiteX0" y="connsiteY0"/>
+              </a:cxn>
+              <a:cxn ang="0">
+                <a:pos x="connsiteX1" y="connsiteY1"/>
+              </a:cxn>
+              <a:cxn ang="0">
+                <a:pos x="connsiteX2" y="connsiteY2"/>
+              </a:cxn>
+              <a:cxn ang="0">
+                <a:pos x="connsiteX3" y="connsiteY3"/>
+              </a:cxn>
+              <a:cxn ang="0">
+                <a:pos x="connsiteX4" y="connsiteY4"/>
+              </a:cxn>
+              <a:cxn ang="0">
+                <a:pos x="connsiteX5" y="connsiteY5"/>
+              </a:cxn>
+              <a:cxn ang="0">
+                <a:pos x="connsiteX6" y="connsiteY6"/>
+              </a:cxn>
+              <a:cxn ang="0">
+                <a:pos x="connsiteX7" y="connsiteY7"/>
+              </a:cxn>
+              <a:cxn ang="0">
+                <a:pos x="connsiteX8" y="connsiteY8"/>
+              </a:cxn>
+              <a:cxn ang="0">
+                <a:pos x="connsiteX9" y="connsiteY9"/>
+              </a:cxn>
+              <a:cxn ang="0">
+                <a:pos x="connsiteX10" y="connsiteY10"/>
+              </a:cxn>
+              <a:cxn ang="0">
+                <a:pos x="connsiteX11" y="connsiteY11"/>
+              </a:cxn>
+              <a:cxn ang="0">
+                <a:pos x="connsiteX12" y="connsiteY12"/>
+              </a:cxn>
+              <a:cxn ang="0">
+                <a:pos x="connsiteX13" y="connsiteY13"/>
+              </a:cxn>
+              <a:cxn ang="0">
+                <a:pos x="connsiteX14" y="connsiteY14"/>
+              </a:cxn>
+              <a:cxn ang="0">
+                <a:pos x="connsiteX15" y="connsiteY15"/>
+              </a:cxn>
+              <a:cxn ang="0">
+                <a:pos x="connsiteX16" y="connsiteY16"/>
+              </a:cxn>
+              <a:cxn ang="0">
+                <a:pos x="connsiteX17" y="connsiteY17"/>
+              </a:cxn>
+              <a:cxn ang="0">
+                <a:pos x="connsiteX18" y="connsiteY18"/>
+              </a:cxn>
+            </a:cxnLst>
+            <a:rect l="l" t="t" r="r" b="b"/>
+            <a:pathLst>
+              <a:path w="5410200" h="18288" fill="none" extrusionOk="0">
+                <a:moveTo>
+                  <a:pt x="0" y="0"/>
+                </a:moveTo>
+                <a:cubicBezTo>
+                  <a:pt x="163050" y="-18707"/>
+                  <a:pt x="319321" y="-16364"/>
+                  <a:pt x="568071" y="0"/>
+                </a:cubicBezTo>
+                <a:cubicBezTo>
+                  <a:pt x="816821" y="16364"/>
+                  <a:pt x="1013224" y="-7268"/>
+                  <a:pt x="1298448" y="0"/>
+                </a:cubicBezTo>
+                <a:cubicBezTo>
+                  <a:pt x="1583672" y="7268"/>
+                  <a:pt x="1631711" y="-3367"/>
+                  <a:pt x="1920621" y="0"/>
+                </a:cubicBezTo>
+                <a:cubicBezTo>
+                  <a:pt x="2209531" y="3367"/>
+                  <a:pt x="2364420" y="-19184"/>
+                  <a:pt x="2488692" y="0"/>
+                </a:cubicBezTo>
+                <a:cubicBezTo>
+                  <a:pt x="2612964" y="19184"/>
+                  <a:pt x="3023298" y="-34627"/>
+                  <a:pt x="3219069" y="0"/>
+                </a:cubicBezTo>
+                <a:cubicBezTo>
+                  <a:pt x="3414840" y="34627"/>
+                  <a:pt x="3656810" y="24043"/>
+                  <a:pt x="3895344" y="0"/>
+                </a:cubicBezTo>
+                <a:cubicBezTo>
+                  <a:pt x="4133879" y="-24043"/>
+                  <a:pt x="4393984" y="-19577"/>
+                  <a:pt x="4571619" y="0"/>
+                </a:cubicBezTo>
+                <a:cubicBezTo>
+                  <a:pt x="4749255" y="19577"/>
+                  <a:pt x="5179928" y="-6281"/>
+                  <a:pt x="5410200" y="0"/>
+                </a:cubicBezTo>
+                <a:cubicBezTo>
+                  <a:pt x="5410730" y="6954"/>
+                  <a:pt x="5410934" y="12839"/>
+                  <a:pt x="5410200" y="18288"/>
+                </a:cubicBezTo>
+                <a:cubicBezTo>
+                  <a:pt x="5139060" y="6751"/>
+                  <a:pt x="5121593" y="31035"/>
+                  <a:pt x="4842129" y="18288"/>
+                </a:cubicBezTo>
+                <a:cubicBezTo>
+                  <a:pt x="4562665" y="5541"/>
+                  <a:pt x="4448273" y="9487"/>
+                  <a:pt x="4328160" y="18288"/>
+                </a:cubicBezTo>
+                <a:cubicBezTo>
+                  <a:pt x="4208047" y="27089"/>
+                  <a:pt x="3760936" y="22567"/>
+                  <a:pt x="3597783" y="18288"/>
+                </a:cubicBezTo>
+                <a:cubicBezTo>
+                  <a:pt x="3434630" y="14009"/>
+                  <a:pt x="3299718" y="33213"/>
+                  <a:pt x="3029712" y="18288"/>
+                </a:cubicBezTo>
+                <a:cubicBezTo>
+                  <a:pt x="2759706" y="3363"/>
+                  <a:pt x="2640159" y="27394"/>
+                  <a:pt x="2299335" y="18288"/>
+                </a:cubicBezTo>
+                <a:cubicBezTo>
+                  <a:pt x="1958511" y="9182"/>
+                  <a:pt x="1801186" y="28985"/>
+                  <a:pt x="1514856" y="18288"/>
+                </a:cubicBezTo>
+                <a:cubicBezTo>
+                  <a:pt x="1228526" y="7591"/>
+                  <a:pt x="1063509" y="-5305"/>
+                  <a:pt x="892683" y="18288"/>
+                </a:cubicBezTo>
+                <a:cubicBezTo>
+                  <a:pt x="721857" y="41881"/>
+                  <a:pt x="186945" y="-20897"/>
+                  <a:pt x="0" y="18288"/>
+                </a:cubicBezTo>
+                <a:cubicBezTo>
+                  <a:pt x="-570" y="9279"/>
+                  <a:pt x="132" y="5100"/>
+                  <a:pt x="0" y="0"/>
+                </a:cubicBezTo>
+                <a:close/>
+              </a:path>
+              <a:path w="5410200" h="18288" stroke="0" extrusionOk="0">
+                <a:moveTo>
+                  <a:pt x="0" y="0"/>
+                </a:moveTo>
+                <a:cubicBezTo>
+                  <a:pt x="285096" y="-4925"/>
+                  <a:pt x="376456" y="22268"/>
+                  <a:pt x="622173" y="0"/>
+                </a:cubicBezTo>
+                <a:cubicBezTo>
+                  <a:pt x="867890" y="-22268"/>
+                  <a:pt x="1031392" y="7228"/>
+                  <a:pt x="1136142" y="0"/>
+                </a:cubicBezTo>
+                <a:cubicBezTo>
+                  <a:pt x="1240892" y="-7228"/>
+                  <a:pt x="1561853" y="9877"/>
+                  <a:pt x="1920621" y="0"/>
+                </a:cubicBezTo>
+                <a:cubicBezTo>
+                  <a:pt x="2279389" y="-9877"/>
+                  <a:pt x="2367255" y="19546"/>
+                  <a:pt x="2542794" y="0"/>
+                </a:cubicBezTo>
+                <a:cubicBezTo>
+                  <a:pt x="2718333" y="-19546"/>
+                  <a:pt x="2866732" y="-22226"/>
+                  <a:pt x="3164967" y="0"/>
+                </a:cubicBezTo>
+                <a:cubicBezTo>
+                  <a:pt x="3463202" y="22226"/>
+                  <a:pt x="3568055" y="-2765"/>
+                  <a:pt x="3949446" y="0"/>
+                </a:cubicBezTo>
+                <a:cubicBezTo>
+                  <a:pt x="4330837" y="2765"/>
+                  <a:pt x="4287895" y="10557"/>
+                  <a:pt x="4517517" y="0"/>
+                </a:cubicBezTo>
+                <a:cubicBezTo>
+                  <a:pt x="4747139" y="-10557"/>
+                  <a:pt x="5149588" y="8716"/>
+                  <a:pt x="5410200" y="0"/>
+                </a:cubicBezTo>
+                <a:cubicBezTo>
+                  <a:pt x="5409517" y="5414"/>
+                  <a:pt x="5409480" y="12510"/>
+                  <a:pt x="5410200" y="18288"/>
+                </a:cubicBezTo>
+                <a:cubicBezTo>
+                  <a:pt x="5163327" y="41494"/>
+                  <a:pt x="5008749" y="10693"/>
+                  <a:pt x="4842129" y="18288"/>
+                </a:cubicBezTo>
+                <a:cubicBezTo>
+                  <a:pt x="4675509" y="25883"/>
+                  <a:pt x="4433401" y="-615"/>
+                  <a:pt x="4165854" y="18288"/>
+                </a:cubicBezTo>
+                <a:cubicBezTo>
+                  <a:pt x="3898308" y="37191"/>
+                  <a:pt x="3809032" y="-8710"/>
+                  <a:pt x="3543681" y="18288"/>
+                </a:cubicBezTo>
+                <a:cubicBezTo>
+                  <a:pt x="3278330" y="45286"/>
+                  <a:pt x="3073876" y="-15917"/>
+                  <a:pt x="2759202" y="18288"/>
+                </a:cubicBezTo>
+                <a:cubicBezTo>
+                  <a:pt x="2444528" y="52493"/>
+                  <a:pt x="2204144" y="3372"/>
+                  <a:pt x="1974723" y="18288"/>
+                </a:cubicBezTo>
+                <a:cubicBezTo>
+                  <a:pt x="1745302" y="33204"/>
+                  <a:pt x="1602335" y="31490"/>
+                  <a:pt x="1406652" y="18288"/>
+                </a:cubicBezTo>
+                <a:cubicBezTo>
+                  <a:pt x="1210969" y="5086"/>
+                  <a:pt x="923948" y="3161"/>
+                  <a:pt x="730377" y="18288"/>
+                </a:cubicBezTo>
+                <a:cubicBezTo>
+                  <a:pt x="536806" y="33415"/>
+                  <a:pt x="336496" y="-141"/>
+                  <a:pt x="0" y="18288"/>
+                </a:cubicBezTo>
+                <a:cubicBezTo>
+                  <a:pt x="-306" y="11061"/>
+                  <a:pt x="-655" y="7751"/>
+                  <a:pt x="0" y="0"/>
+                </a:cubicBezTo>
+                <a:close/>
+              </a:path>
+            </a:pathLst>
+          </a:custGeom>
+          <a:solidFill>
+            <a:schemeClr val="accent2"/>
+          </a:solidFill>
+          <a:ln w="41275" cap="rnd">
+            <a:solidFill>
+              <a:schemeClr val="accent2"/>
+            </a:solidFill>
+            <a:round/>
+            <a:extLst>
+              <a:ext uri="{C807C97D-BFC1-408E-A445-0C87EB9F89A2}">
+                <ask:lineSketchStyleProps xmlns:ask="http://schemas.microsoft.com/office/drawing/2018/sketchyshapes" sd="1219033472">
+                  <a:prstGeom prst="rect">
+                    <a:avLst/>
+                  </a:prstGeom>
+                  <ask:type>
+                    <ask:lineSketchFreehand/>
+                  </ask:type>
+                </ask:lineSketchStyleProps>
+              </a:ext>
+            </a:extLst>
+          </a:ln>
+        </p:spPr>
+        <p:style>
+          <a:lnRef idx="2">
+            <a:schemeClr val="accent1">
+              <a:shade val="50000"/>
+            </a:schemeClr>
+          </a:lnRef>
+          <a:fillRef idx="1">
+            <a:schemeClr val="accent1"/>
+          </a:fillRef>
+          <a:effectRef idx="0">
+            <a:schemeClr val="accent1"/>
+          </a:effectRef>
+          <a:fontRef idx="minor">
+            <a:schemeClr val="lt1"/>
+          </a:fontRef>
+        </p:style>
+        <p:txBody>
+          <a:bodyPr rtlCol="0" anchor="ctr"/>
+          <a:lstStyle/>
+          <a:p>
+            <a:pPr algn="ctr"/>
+            <a:endParaRPr lang="en-US"/>
+          </a:p>
+        </p:txBody>
+      </p:sp>
+      <p:sp>
+        <p:nvSpPr>
+          <p:cNvPr id="4" name="Footer Placeholder 3">
+            <a:extLst>
+              <a:ext uri="{FF2B5EF4-FFF2-40B4-BE49-F238E27FC236}">
+                <a16:creationId xmlns:a16="http://schemas.microsoft.com/office/drawing/2014/main" id="{F8993BB5-426F-FC49-9AE2-EA5D1AFB000D}"/>
+              </a:ext>
+            </a:extLst>
+          </p:cNvPr>
+          <p:cNvSpPr>
+            <a:spLocks noGrp="1"/>
+          </p:cNvSpPr>
+          <p:nvPr>
+            <p:ph type="ftr" sz="quarter" idx="11"/>
+          </p:nvPr>
+        </p:nvSpPr>
+        <p:spPr>
+          <a:xfrm>
+            <a:off x="4038600" y="6356350"/>
+            <a:ext cx="4114800" cy="365125"/>
+          </a:xfrm>
+        </p:spPr>
+        <p:txBody>
+          <a:bodyPr vert="horz" lIns="91440" tIns="45720" rIns="91440" bIns="45720" rtlCol="0" anchor="ctr">
+            <a:normAutofit/>
+          </a:bodyPr>
+          <a:lstStyle/>
+          <a:p>
+            <a:pPr>
+              <a:spcAft>
+                <a:spcPts val="600"/>
+              </a:spcAft>
+            </a:pPr>
+            <a:r>
+              <a:rPr lang="en-US" kern="1200">
+                <a:solidFill>
+                  <a:schemeClr val="tx1">
+                    <a:tint val="75000"/>
+                  </a:schemeClr>
+                </a:solidFill>
+                <a:latin typeface="+mn-lt"/>
+                <a:ea typeface="+mn-ea"/>
+                <a:cs typeface="+mn-cs"/>
+              </a:rPr>
+              <a:t>© 2021 Stefan Kürzeder</a:t>
+            </a:r>
+          </a:p>
+        </p:txBody>
+      </p:sp>
+      <p:sp>
+        <p:nvSpPr>
+          <p:cNvPr id="7" name="TextBox 6">
+            <a:extLst>
+              <a:ext uri="{FF2B5EF4-FFF2-40B4-BE49-F238E27FC236}">
+                <a16:creationId xmlns:a16="http://schemas.microsoft.com/office/drawing/2014/main" id="{7A09900A-FA02-CA4F-B761-19D231F3606D}"/>
+              </a:ext>
+            </a:extLst>
+          </p:cNvPr>
+          <p:cNvSpPr txBox="1"/>
+          <p:nvPr/>
+        </p:nvSpPr>
+        <p:spPr>
+          <a:xfrm>
+            <a:off x="912091" y="4248926"/>
+            <a:ext cx="2447914" cy="369332"/>
+          </a:xfrm>
+          <a:prstGeom prst="rect">
+            <a:avLst/>
+          </a:prstGeom>
+          <a:noFill/>
+        </p:spPr>
+        <p:txBody>
+          <a:bodyPr wrap="none" rtlCol="0">
+            <a:spAutoFit/>
+          </a:bodyPr>
+          <a:lstStyle/>
+          <a:p>
+            <a:r>
+              <a:rPr lang="en-DE" dirty="0">
+                <a:latin typeface="+mj-lt"/>
+              </a:rPr>
+              <a:t>Source Code on </a:t>
+            </a:r>
+            <a:r>
+              <a:rPr lang="en-DE" dirty="0">
+                <a:latin typeface="+mj-lt"/>
+                <a:hlinkClick r:id="rId2"/>
+              </a:rPr>
+              <a:t>GitHub</a:t>
+            </a:r>
+            <a:r>
+              <a:rPr lang="en-DE" dirty="0">
+                <a:latin typeface="+mj-lt"/>
+              </a:rPr>
+              <a:t>!</a:t>
+            </a:r>
+          </a:p>
+        </p:txBody>
+      </p:sp>
+    </p:spTree>
+    <p:extLst>
+      <p:ext uri="{BB962C8B-B14F-4D97-AF65-F5344CB8AC3E}">
+        <p14:creationId xmlns:p14="http://schemas.microsoft.com/office/powerpoint/2010/main" val="4156359318"/>
       </p:ext>
     </p:extLst>
   </p:cSld>

</xml_diff>